<commit_message>
first draft its and causal impact lecture, small changes elsewhere
</commit_message>
<xml_diff>
--- a/lectures/01_introduction/intro_1.pptx
+++ b/lectures/01_introduction/intro_1.pptx
@@ -23,7 +23,7 @@
     <p:sldId id="370" r:id="rId14"/>
     <p:sldId id="371" r:id="rId15"/>
     <p:sldId id="372" r:id="rId16"/>
-    <p:sldId id="376" r:id="rId17"/>
+    <p:sldId id="400" r:id="rId17"/>
     <p:sldId id="377" r:id="rId18"/>
     <p:sldId id="378" r:id="rId19"/>
     <p:sldId id="379" r:id="rId20"/>
@@ -302,7 +302,7 @@
             <a:fld id="{61C17900-95FA-4124-853C-9BC71B59CBE5}" type="datetime1">
               <a:rPr lang="en-GB"/>
               <a:pPr lvl="0"/>
-              <a:t>09/05/2023</a:t>
+              <a:t>15/05/2023</a:t>
             </a:fld>
             <a:endParaRPr lang="en-GB"/>
           </a:p>
@@ -4825,7 +4825,7 @@
             <a:fld id="{4A25D1A3-0A93-4C94-80FF-26B8FD61124B}" type="datetime1">
               <a:rPr lang="en-GB"/>
               <a:pPr lvl="0"/>
-              <a:t>09/05/2023</a:t>
+              <a:t>15/05/2023</a:t>
             </a:fld>
             <a:endParaRPr lang="en-GB"/>
           </a:p>
@@ -5062,7 +5062,7 @@
             <a:fld id="{81142B93-5A2B-450B-8B37-47C337A7F461}" type="datetime1">
               <a:rPr lang="en-GB"/>
               <a:pPr lvl="0"/>
-              <a:t>09/05/2023</a:t>
+              <a:t>15/05/2023</a:t>
             </a:fld>
             <a:endParaRPr lang="en-GB"/>
           </a:p>
@@ -5308,7 +5308,7 @@
             <a:fld id="{6E063067-B603-41EE-A9A7-41899DD775E6}" type="datetime1">
               <a:rPr lang="en-GB"/>
               <a:pPr lvl="0"/>
-              <a:t>09/05/2023</a:t>
+              <a:t>15/05/2023</a:t>
             </a:fld>
             <a:endParaRPr lang="en-GB"/>
           </a:p>
@@ -5544,7 +5544,7 @@
             <a:fld id="{6F249873-F8C6-4397-84F9-F8EC0F22A697}" type="datetime1">
               <a:rPr lang="en-GB"/>
               <a:pPr lvl="0"/>
-              <a:t>09/05/2023</a:t>
+              <a:t>15/05/2023</a:t>
             </a:fld>
             <a:endParaRPr lang="en-GB"/>
           </a:p>
@@ -5755,7 +5755,7 @@
             <a:fld id="{C12BD4ED-6206-4BF6-96F8-E25353DC0FB4}" type="datetime1">
               <a:rPr lang="en-GB"/>
               <a:pPr lvl="0"/>
-              <a:t>09/05/2023</a:t>
+              <a:t>15/05/2023</a:t>
             </a:fld>
             <a:endParaRPr lang="en-GB"/>
           </a:p>
@@ -6075,7 +6075,7 @@
             <a:fld id="{39B86B4E-481C-4780-B006-4B46E923812F}" type="datetime1">
               <a:rPr lang="en-GB"/>
               <a:pPr lvl="0"/>
-              <a:t>09/05/2023</a:t>
+              <a:t>15/05/2023</a:t>
             </a:fld>
             <a:endParaRPr lang="en-GB"/>
           </a:p>
@@ -6478,7 +6478,7 @@
             <a:fld id="{4D4B0C8B-6A6B-4F9A-AD92-C7A874294C43}" type="datetime1">
               <a:rPr lang="en-GB"/>
               <a:pPr lvl="0"/>
-              <a:t>09/05/2023</a:t>
+              <a:t>15/05/2023</a:t>
             </a:fld>
             <a:endParaRPr lang="en-GB"/>
           </a:p>
@@ -6640,7 +6640,7 @@
             <a:fld id="{2242089C-BC90-4A09-BBF2-11ACCFCC6AAC}" type="datetime1">
               <a:rPr lang="en-GB"/>
               <a:pPr lvl="0"/>
-              <a:t>09/05/2023</a:t>
+              <a:t>15/05/2023</a:t>
             </a:fld>
             <a:endParaRPr lang="en-GB"/>
           </a:p>
@@ -6768,7 +6768,7 @@
             <a:fld id="{9E45A0C3-C9A4-409A-ABC1-542A7544900D}" type="datetime1">
               <a:rPr lang="en-GB"/>
               <a:pPr lvl="0"/>
-              <a:t>09/05/2023</a:t>
+              <a:t>15/05/2023</a:t>
             </a:fld>
             <a:endParaRPr lang="en-GB"/>
           </a:p>
@@ -7053,7 +7053,7 @@
             <a:fld id="{FE905373-3B96-430D-80BE-EEB6F3514509}" type="datetime1">
               <a:rPr lang="en-GB"/>
               <a:pPr lvl="0"/>
-              <a:t>09/05/2023</a:t>
+              <a:t>15/05/2023</a:t>
             </a:fld>
             <a:endParaRPr lang="en-GB"/>
           </a:p>
@@ -7295,7 +7295,7 @@
             <a:fld id="{FD713A6C-3BFD-4C18-89E6-78D595B19DB8}" type="datetime1">
               <a:rPr lang="en-GB"/>
               <a:pPr lvl="0"/>
-              <a:t>09/05/2023</a:t>
+              <a:t>15/05/2023</a:t>
             </a:fld>
             <a:endParaRPr lang="en-GB"/>
           </a:p>
@@ -7578,7 +7578,7 @@
             <a:fld id="{19E4415A-9E33-406F-911E-8770DEE3AE96}" type="datetime1">
               <a:rPr lang="en-GB"/>
               <a:pPr lvl="0"/>
-              <a:t>09/05/2023</a:t>
+              <a:t>15/05/2023</a:t>
             </a:fld>
             <a:endParaRPr lang="en-GB"/>
           </a:p>
@@ -8925,8 +8925,8 @@
           </a:p>
         </p:txBody>
       </p:sp>
-      <mc:AlternateContent xmlns:mc="http://schemas.openxmlformats.org/markup-compatibility/2006" xmlns:a14="http://schemas.microsoft.com/office/drawing/2010/main">
-        <mc:Choice Requires="a14">
+      <mc:AlternateContent xmlns:mc="http://schemas.openxmlformats.org/markup-compatibility/2006">
+        <mc:Choice xmlns:a14="http://schemas.microsoft.com/office/drawing/2010/main" Requires="a14">
           <p:sp>
             <p:nvSpPr>
               <p:cNvPr id="3" name="Content Placeholder 2">
@@ -8951,7 +8951,7 @@
             </p:spPr>
             <p:txBody>
               <a:bodyPr>
-                <a:normAutofit fontScale="85000" lnSpcReduction="10000"/>
+                <a:normAutofit fontScale="85000" lnSpcReduction="20000"/>
               </a:bodyPr>
               <a:lstStyle/>
               <a:p>
@@ -9033,7 +9033,7 @@
                     </a:solidFill>
                     <a:latin typeface="Fira Sans" pitchFamily="34"/>
                   </a:rPr>
-                  <a:t>represent your headache level (low is no headache, high is a very bad headache), and let </a:t>
+                  <a:t>represent your headache level (high is a very bad headache, low is no headache), and let </a:t>
                 </a:r>
                 <a14:m>
                   <m:oMath xmlns:m="http://schemas.openxmlformats.org/officeDocument/2006/math">
@@ -9120,7 +9120,7 @@
                     </a:solidFill>
                     <a:latin typeface="Fira Sans" pitchFamily="34"/>
                   </a:rPr>
-                  <a:t>You only want to take an aspirin if your headache </a:t>
+                  <a:t>You only want to take an aspirin if your headache level </a:t>
                 </a:r>
                 <a:r>
                   <a:rPr lang="en-GB" b="1" dirty="0">
@@ -9138,7 +9138,7 @@
                     </a:solidFill>
                     <a:latin typeface="Fira Sans" pitchFamily="34"/>
                   </a:rPr>
-                  <a:t> would improve relative to your headache </a:t>
+                  <a:t> is lower relative to what your headache would be </a:t>
                 </a:r>
                 <a:r>
                   <a:rPr lang="en-GB" b="1" dirty="0">
@@ -9147,7 +9147,7 @@
                     </a:solidFill>
                     <a:latin typeface="Fira Sans" pitchFamily="34"/>
                   </a:rPr>
-                  <a:t>without taking aspirin</a:t>
+                  <a:t>if you wouldn’t take aspirin</a:t>
                 </a:r>
                 <a:endParaRPr lang="en-GB" dirty="0">
                   <a:solidFill>
@@ -9362,7 +9362,7 @@
             </p:txBody>
           </p:sp>
         </mc:Choice>
-        <mc:Fallback xmlns="">
+        <mc:Fallback>
           <p:sp>
             <p:nvSpPr>
               <p:cNvPr id="3" name="Content Placeholder 2">
@@ -9387,7 +9387,7 @@
               <a:blipFill>
                 <a:blip r:embed="rId2"/>
                 <a:stretch>
-                  <a:fillRect l="-928" t="-620" b="-2354"/>
+                  <a:fillRect l="-928" t="-991" r="-754" b="-2850"/>
                 </a:stretch>
               </a:blipFill>
             </p:spPr>
@@ -9914,31 +9914,25 @@
           </a:p>
         </p:txBody>
       </p:sp>
-      <mc:AlternateContent xmlns:mc="http://schemas.openxmlformats.org/markup-compatibility/2006" xmlns:a14="http://schemas.microsoft.com/office/drawing/2010/main">
-        <mc:Choice Requires="a14">
+      <mc:AlternateContent xmlns:mc="http://schemas.openxmlformats.org/markup-compatibility/2006">
+        <mc:Choice xmlns:a14="http://schemas.microsoft.com/office/drawing/2010/main" Requires="a14">
           <p:graphicFrame>
             <p:nvGraphicFramePr>
-              <p:cNvPr id="6" name="Table 6">
+              <p:cNvPr id="3" name="Table 6">
                 <a:extLst>
                   <a:ext uri="{FF2B5EF4-FFF2-40B4-BE49-F238E27FC236}">
-                    <a16:creationId xmlns:a16="http://schemas.microsoft.com/office/drawing/2014/main" id="{F72BD6FC-4ED6-91E7-9B54-BC44BC9F7934}"/>
+                    <a16:creationId xmlns:a16="http://schemas.microsoft.com/office/drawing/2014/main" id="{7F5D5E0C-E332-687C-116D-5583F775151D}"/>
                   </a:ext>
                 </a:extLst>
               </p:cNvPr>
               <p:cNvGraphicFramePr>
                 <a:graphicFrameLocks noGrp="1"/>
               </p:cNvGraphicFramePr>
-              <p:nvPr>
-                <p:extLst>
-                  <p:ext uri="{D42A27DB-BD31-4B8C-83A1-F6EECF244321}">
-                    <p14:modId xmlns:p14="http://schemas.microsoft.com/office/powerpoint/2010/main" val="1725799929"/>
-                  </p:ext>
-                </p:extLst>
-              </p:nvPr>
+              <p:nvPr/>
             </p:nvGraphicFramePr>
             <p:xfrm>
-              <a:off x="1752600" y="989045"/>
-              <a:ext cx="4874064" cy="5587801"/>
+              <a:off x="1748347" y="989045"/>
+              <a:ext cx="8123440" cy="5587802"/>
             </p:xfrm>
             <a:graphic>
               <a:graphicData uri="http://schemas.openxmlformats.org/drawingml/2006/table">
@@ -9968,6 +9962,20 @@
                         </a:ext>
                       </a:extLst>
                     </a:gridCol>
+                    <a:gridCol w="1624688">
+                      <a:extLst>
+                        <a:ext uri="{9D8B030D-6E8A-4147-A177-3AD203B41FA5}">
+                          <a16:colId xmlns:a16="http://schemas.microsoft.com/office/drawing/2014/main" val="2809065463"/>
+                        </a:ext>
+                      </a:extLst>
+                    </a:gridCol>
+                    <a:gridCol w="1624688">
+                      <a:extLst>
+                        <a:ext uri="{9D8B030D-6E8A-4147-A177-3AD203B41FA5}">
+                          <a16:colId xmlns:a16="http://schemas.microsoft.com/office/drawing/2014/main" val="3102601274"/>
+                        </a:ext>
+                      </a:extLst>
+                    </a:gridCol>
                   </a:tblGrid>
                   <a:tr h="414241">
                     <a:tc>
@@ -9975,7 +9983,7 @@
                         <a:bodyPr/>
                         <a:lstStyle/>
                         <a:p>
-                          <a:endParaRPr lang="nl-NL" dirty="0"/>
+                          <a:endParaRPr lang="nl-NL" sz="1900" dirty="0"/>
                         </a:p>
                       </a:txBody>
                       <a:tcPr>
@@ -10020,7 +10028,7 @@
                         <a:bodyPr/>
                         <a:lstStyle/>
                         <a:p>
-                          <a:endParaRPr lang="nl-NL" dirty="0"/>
+                          <a:endParaRPr lang="nl-NL" sz="1900" dirty="0"/>
                         </a:p>
                       </a:txBody>
                       <a:tcPr>
@@ -10062,7 +10070,7 @@
                         <a:bodyPr/>
                         <a:lstStyle/>
                         <a:p>
-                          <a:endParaRPr lang="nl-NL" dirty="0"/>
+                          <a:endParaRPr lang="nl-NL" sz="1900" dirty="0"/>
                         </a:p>
                       </a:txBody>
                       <a:tcPr>
@@ -10073,6 +10081,96 @@
                         <a:lnR w="12700" cmpd="sng">
                           <a:noFill/>
                           <a:prstDash val="solid"/>
+                        </a:lnR>
+                        <a:lnT w="12701" cap="flat" cmpd="sng" algn="ctr">
+                          <a:noFill/>
+                          <a:prstDash val="solid"/>
+                          <a:round/>
+                          <a:headEnd type="none" w="med" len="med"/>
+                          <a:tailEnd type="none" w="med" len="med"/>
+                        </a:lnT>
+                        <a:lnB w="38103" cap="flat" cmpd="sng" algn="ctr">
+                          <a:noFill/>
+                          <a:prstDash val="solid"/>
+                          <a:round/>
+                          <a:headEnd type="none" w="med" len="med"/>
+                          <a:tailEnd type="none" w="med" len="med"/>
+                        </a:lnB>
+                        <a:lnTlToBr w="12700" cmpd="sng">
+                          <a:noFill/>
+                          <a:prstDash val="solid"/>
+                        </a:lnTlToBr>
+                        <a:lnBlToTr w="12700" cmpd="sng">
+                          <a:noFill/>
+                          <a:prstDash val="solid"/>
+                        </a:lnBlToTr>
+                        <a:noFill/>
+                      </a:tcPr>
+                    </a:tc>
+                    <a:tc>
+                      <a:txBody>
+                        <a:bodyPr/>
+                        <a:lstStyle/>
+                        <a:p>
+                          <a:endParaRPr lang="nl-NL" sz="1900" dirty="0"/>
+                        </a:p>
+                      </a:txBody>
+                      <a:tcPr>
+                        <a:lnL w="12700" cmpd="sng">
+                          <a:noFill/>
+                          <a:prstDash val="solid"/>
+                        </a:lnL>
+                        <a:lnR w="12701" cap="flat" cmpd="sng" algn="ctr">
+                          <a:noFill/>
+                          <a:prstDash val="solid"/>
+                          <a:round/>
+                          <a:headEnd type="none" w="med" len="med"/>
+                          <a:tailEnd type="none" w="med" len="med"/>
+                        </a:lnR>
+                        <a:lnT w="12701" cap="flat" cmpd="sng" algn="ctr">
+                          <a:noFill/>
+                          <a:prstDash val="solid"/>
+                          <a:round/>
+                          <a:headEnd type="none" w="med" len="med"/>
+                          <a:tailEnd type="none" w="med" len="med"/>
+                        </a:lnT>
+                        <a:lnB w="38103" cap="flat" cmpd="sng" algn="ctr">
+                          <a:noFill/>
+                          <a:prstDash val="solid"/>
+                          <a:round/>
+                          <a:headEnd type="none" w="med" len="med"/>
+                          <a:tailEnd type="none" w="med" len="med"/>
+                        </a:lnB>
+                        <a:lnTlToBr w="12700" cmpd="sng">
+                          <a:noFill/>
+                          <a:prstDash val="solid"/>
+                        </a:lnTlToBr>
+                        <a:lnBlToTr w="12700" cmpd="sng">
+                          <a:noFill/>
+                          <a:prstDash val="solid"/>
+                        </a:lnBlToTr>
+                        <a:noFill/>
+                      </a:tcPr>
+                    </a:tc>
+                    <a:tc>
+                      <a:txBody>
+                        <a:bodyPr/>
+                        <a:lstStyle/>
+                        <a:p>
+                          <a:endParaRPr lang="nl-NL" sz="1900" dirty="0"/>
+                        </a:p>
+                      </a:txBody>
+                      <a:tcPr>
+                        <a:lnL w="12700" cmpd="sng">
+                          <a:noFill/>
+                          <a:prstDash val="solid"/>
+                        </a:lnL>
+                        <a:lnR w="12701" cap="flat" cmpd="sng" algn="ctr">
+                          <a:noFill/>
+                          <a:prstDash val="solid"/>
+                          <a:round/>
+                          <a:headEnd type="none" w="med" len="med"/>
+                          <a:tailEnd type="none" w="med" len="med"/>
                         </a:lnR>
                         <a:lnT w="12701" cap="flat" cmpd="sng" algn="ctr">
                           <a:noFill/>
@@ -10105,7 +10203,7 @@
                       </a:ext>
                     </a:extLst>
                   </a:tr>
-                  <a:tr h="465540">
+                  <a:tr h="518161">
                     <a:tc>
                       <a:txBody>
                         <a:bodyPr/>
@@ -10211,6 +10309,114 @@
                         <a:noFill/>
                       </a:tcPr>
                     </a:tc>
+                    <a:tc>
+                      <a:txBody>
+                        <a:bodyPr/>
+                        <a:lstStyle/>
+                        <a:p>
+                          <a:pPr/>
+                          <a14:m>
+                            <m:oMathPara xmlns:m="http://schemas.openxmlformats.org/officeDocument/2006/math">
+                              <m:oMathParaPr>
+                                <m:jc m:val="centerGroup"/>
+                              </m:oMathParaPr>
+                              <m:oMath xmlns:m="http://schemas.openxmlformats.org/officeDocument/2006/math">
+                                <m:sSup>
+                                  <m:sSupPr>
+                                    <m:ctrlPr>
+                                      <a:rPr lang="en-GB" sz="2800" b="0" i="1" smtClean="0">
+                                        <a:latin typeface="Cambria Math" panose="02040503050406030204" pitchFamily="18" charset="0"/>
+                                      </a:rPr>
+                                    </m:ctrlPr>
+                                  </m:sSupPr>
+                                  <m:e>
+                                    <m:r>
+                                      <a:rPr lang="en-GB" sz="2800" b="0" i="1" smtClean="0">
+                                        <a:latin typeface="Cambria Math" panose="02040503050406030204" pitchFamily="18" charset="0"/>
+                                      </a:rPr>
+                                      <m:t>𝑌</m:t>
+                                    </m:r>
+                                  </m:e>
+                                  <m:sup>
+                                    <m:r>
+                                      <a:rPr lang="en-GB" sz="2800" b="0" i="1" smtClean="0">
+                                        <a:latin typeface="Cambria Math" panose="02040503050406030204" pitchFamily="18" charset="0"/>
+                                      </a:rPr>
+                                      <m:t>0</m:t>
+                                    </m:r>
+                                  </m:sup>
+                                </m:sSup>
+                              </m:oMath>
+                            </m:oMathPara>
+                          </a14:m>
+                          <a:endParaRPr lang="nl-NL" sz="2800" dirty="0"/>
+                        </a:p>
+                      </a:txBody>
+                      <a:tcPr>
+                        <a:lnT w="38103" cap="flat" cmpd="sng" algn="ctr">
+                          <a:noFill/>
+                          <a:prstDash val="solid"/>
+                          <a:round/>
+                          <a:headEnd type="none" w="med" len="med"/>
+                          <a:tailEnd type="none" w="med" len="med"/>
+                        </a:lnT>
+                        <a:noFill/>
+                      </a:tcPr>
+                    </a:tc>
+                    <a:tc>
+                      <a:txBody>
+                        <a:bodyPr/>
+                        <a:lstStyle/>
+                        <a:p>
+                          <a:pPr/>
+                          <a14:m>
+                            <m:oMathPara xmlns:m="http://schemas.openxmlformats.org/officeDocument/2006/math">
+                              <m:oMathParaPr>
+                                <m:jc m:val="centerGroup"/>
+                              </m:oMathParaPr>
+                              <m:oMath xmlns:m="http://schemas.openxmlformats.org/officeDocument/2006/math">
+                                <m:sSup>
+                                  <m:sSupPr>
+                                    <m:ctrlPr>
+                                      <a:rPr lang="en-GB" sz="2800" b="0" i="1" smtClean="0">
+                                        <a:latin typeface="Cambria Math" panose="02040503050406030204" pitchFamily="18" charset="0"/>
+                                      </a:rPr>
+                                    </m:ctrlPr>
+                                  </m:sSupPr>
+                                  <m:e>
+                                    <m:r>
+                                      <a:rPr lang="en-GB" sz="2800" b="0" i="1" smtClean="0">
+                                        <a:latin typeface="Cambria Math" panose="02040503050406030204" pitchFamily="18" charset="0"/>
+                                      </a:rPr>
+                                      <m:t>𝑌</m:t>
+                                    </m:r>
+                                  </m:e>
+                                  <m:sup>
+                                    <m:r>
+                                      <a:rPr lang="en-GB" sz="2800" b="0" i="1" smtClean="0">
+                                        <a:latin typeface="Cambria Math" panose="02040503050406030204" pitchFamily="18" charset="0"/>
+                                      </a:rPr>
+                                      <m:t>1</m:t>
+                                    </m:r>
+                                  </m:sup>
+                                </m:sSup>
+                              </m:oMath>
+                            </m:oMathPara>
+                          </a14:m>
+                          <a:endParaRPr lang="nl-NL" sz="2800" dirty="0"/>
+                        </a:p>
+                      </a:txBody>
+                      <a:tcPr>
+                        <a:lnT w="38103" cap="flat" cmpd="sng" algn="ctr">
+                          <a:noFill/>
+                          <a:prstDash val="solid"/>
+                          <a:round/>
+                          <a:headEnd type="none" w="med" len="med"/>
+                          <a:tailEnd type="none" w="med" len="med"/>
+                        </a:lnT>
+                        <a:noFill/>
+                      </a:tcPr>
+                    </a:tc>
                     <a:extLst>
                       <a:ext uri="{0D108BD9-81ED-4DB2-BD59-A6C34878D82A}">
                         <a16:rowId xmlns:a16="http://schemas.microsoft.com/office/drawing/2014/main" val="1687714552"/>
@@ -10218,6 +10424,797 @@
                     </a:extLst>
                   </a:tr>
                   <a:tr h="465540">
+                    <a:tc>
+                      <a:txBody>
+                        <a:bodyPr/>
+                        <a:lstStyle/>
+                        <a:p>
+                          <a:pPr/>
+                          <a14:m>
+                            <m:oMathPara xmlns:m="http://schemas.openxmlformats.org/officeDocument/2006/math">
+                              <m:oMathParaPr>
+                                <m:jc m:val="centerGroup"/>
+                              </m:oMathParaPr>
+                              <m:oMath xmlns:m="http://schemas.openxmlformats.org/officeDocument/2006/math">
+                                <m:r>
+                                  <a:rPr lang="en-GB" sz="2100" b="0" i="1" smtClean="0">
+                                    <a:latin typeface="Cambria Math" panose="02040503050406030204" pitchFamily="18" charset="0"/>
+                                  </a:rPr>
+                                  <m:t>1</m:t>
+                                </m:r>
+                              </m:oMath>
+                            </m:oMathPara>
+                          </a14:m>
+                          <a:endParaRPr lang="nl-NL" sz="2100" dirty="0"/>
+                        </a:p>
+                      </a:txBody>
+                      <a:tcPr>
+                        <a:noFill/>
+                      </a:tcPr>
+                    </a:tc>
+                    <a:tc>
+                      <a:txBody>
+                        <a:bodyPr/>
+                        <a:lstStyle/>
+                        <a:p>
+                          <a:pPr/>
+                          <a14:m>
+                            <m:oMathPara xmlns:m="http://schemas.openxmlformats.org/officeDocument/2006/math">
+                              <m:oMathParaPr>
+                                <m:jc m:val="centerGroup"/>
+                              </m:oMathParaPr>
+                              <m:oMath xmlns:m="http://schemas.openxmlformats.org/officeDocument/2006/math">
+                                <m:r>
+                                  <a:rPr lang="en-GB" sz="2100" b="0" i="1" smtClean="0">
+                                    <a:latin typeface="Cambria Math" panose="02040503050406030204" pitchFamily="18" charset="0"/>
+                                  </a:rPr>
+                                  <m:t>7</m:t>
+                                </m:r>
+                              </m:oMath>
+                            </m:oMathPara>
+                          </a14:m>
+                          <a:endParaRPr lang="nl-NL" sz="2100" dirty="0"/>
+                        </a:p>
+                      </a:txBody>
+                      <a:tcPr>
+                        <a:noFill/>
+                      </a:tcPr>
+                    </a:tc>
+                    <a:tc>
+                      <a:txBody>
+                        <a:bodyPr/>
+                        <a:lstStyle/>
+                        <a:p>
+                          <a:pPr/>
+                          <a14:m>
+                            <m:oMathPara xmlns:m="http://schemas.openxmlformats.org/officeDocument/2006/math">
+                              <m:oMathParaPr>
+                                <m:jc m:val="centerGroup"/>
+                              </m:oMathParaPr>
+                              <m:oMath xmlns:m="http://schemas.openxmlformats.org/officeDocument/2006/math">
+                                <m:r>
+                                  <a:rPr lang="en-GB" sz="2000" b="0" i="1" smtClean="0">
+                                    <a:latin typeface="Cambria Math" panose="02040503050406030204" pitchFamily="18" charset="0"/>
+                                  </a:rPr>
+                                  <m:t>0</m:t>
+                                </m:r>
+                              </m:oMath>
+                            </m:oMathPara>
+                          </a14:m>
+                          <a:endParaRPr lang="nl-NL" sz="2000" dirty="0"/>
+                        </a:p>
+                      </a:txBody>
+                      <a:tcPr>
+                        <a:noFill/>
+                      </a:tcPr>
+                    </a:tc>
+                    <a:tc>
+                      <a:txBody>
+                        <a:bodyPr/>
+                        <a:lstStyle/>
+                        <a:p>
+                          <a:pPr/>
+                          <a14:m>
+                            <m:oMathPara xmlns:m="http://schemas.openxmlformats.org/officeDocument/2006/math">
+                              <m:oMathParaPr>
+                                <m:jc m:val="centerGroup"/>
+                              </m:oMathParaPr>
+                              <m:oMath xmlns:m="http://schemas.openxmlformats.org/officeDocument/2006/math">
+                                <m:r>
+                                  <a:rPr lang="en-GB" sz="2100" b="0" i="1" smtClean="0">
+                                    <a:latin typeface="Cambria Math" panose="02040503050406030204" pitchFamily="18" charset="0"/>
+                                  </a:rPr>
+                                  <m:t>7</m:t>
+                                </m:r>
+                              </m:oMath>
+                            </m:oMathPara>
+                          </a14:m>
+                          <a:endParaRPr lang="nl-NL" sz="2100" dirty="0"/>
+                        </a:p>
+                      </a:txBody>
+                      <a:tcPr>
+                        <a:noFill/>
+                      </a:tcPr>
+                    </a:tc>
+                    <a:tc>
+                      <a:txBody>
+                        <a:bodyPr/>
+                        <a:lstStyle/>
+                        <a:p>
+                          <a:pPr/>
+                          <a14:m>
+                            <m:oMathPara xmlns:m="http://schemas.openxmlformats.org/officeDocument/2006/math">
+                              <m:oMathParaPr>
+                                <m:jc m:val="centerGroup"/>
+                              </m:oMathParaPr>
+                              <m:oMath xmlns:m="http://schemas.openxmlformats.org/officeDocument/2006/math">
+                                <m:r>
+                                  <a:rPr lang="en-GB" sz="2100" b="0" i="1" smtClean="0">
+                                    <a:latin typeface="Cambria Math" panose="02040503050406030204" pitchFamily="18" charset="0"/>
+                                  </a:rPr>
+                                  <m:t>𝑁𝐴</m:t>
+                                </m:r>
+                              </m:oMath>
+                            </m:oMathPara>
+                          </a14:m>
+                          <a:endParaRPr lang="nl-NL" sz="2100" dirty="0"/>
+                        </a:p>
+                      </a:txBody>
+                      <a:tcPr>
+                        <a:noFill/>
+                      </a:tcPr>
+                    </a:tc>
+                    <a:extLst>
+                      <a:ext uri="{0D108BD9-81ED-4DB2-BD59-A6C34878D82A}">
+                        <a16:rowId xmlns:a16="http://schemas.microsoft.com/office/drawing/2014/main" val="390264655"/>
+                      </a:ext>
+                    </a:extLst>
+                  </a:tr>
+                  <a:tr h="465540">
+                    <a:tc>
+                      <a:txBody>
+                        <a:bodyPr/>
+                        <a:lstStyle/>
+                        <a:p>
+                          <a:pPr/>
+                          <a14:m>
+                            <m:oMathPara xmlns:m="http://schemas.openxmlformats.org/officeDocument/2006/math">
+                              <m:oMathParaPr>
+                                <m:jc m:val="centerGroup"/>
+                              </m:oMathParaPr>
+                              <m:oMath xmlns:m="http://schemas.openxmlformats.org/officeDocument/2006/math">
+                                <m:r>
+                                  <a:rPr lang="en-GB" sz="2100" b="0" i="1" smtClean="0">
+                                    <a:latin typeface="Cambria Math" panose="02040503050406030204" pitchFamily="18" charset="0"/>
+                                  </a:rPr>
+                                  <m:t>2</m:t>
+                                </m:r>
+                              </m:oMath>
+                            </m:oMathPara>
+                          </a14:m>
+                          <a:endParaRPr lang="nl-NL" sz="2100" dirty="0"/>
+                        </a:p>
+                      </a:txBody>
+                      <a:tcPr>
+                        <a:noFill/>
+                      </a:tcPr>
+                    </a:tc>
+                    <a:tc>
+                      <a:txBody>
+                        <a:bodyPr/>
+                        <a:lstStyle/>
+                        <a:p>
+                          <a:pPr/>
+                          <a14:m>
+                            <m:oMathPara xmlns:m="http://schemas.openxmlformats.org/officeDocument/2006/math">
+                              <m:oMathParaPr>
+                                <m:jc m:val="centerGroup"/>
+                              </m:oMathParaPr>
+                              <m:oMath xmlns:m="http://schemas.openxmlformats.org/officeDocument/2006/math">
+                                <m:r>
+                                  <a:rPr lang="en-GB" sz="2100" b="0" i="1" smtClean="0">
+                                    <a:latin typeface="Cambria Math" panose="02040503050406030204" pitchFamily="18" charset="0"/>
+                                  </a:rPr>
+                                  <m:t>9</m:t>
+                                </m:r>
+                              </m:oMath>
+                            </m:oMathPara>
+                          </a14:m>
+                          <a:endParaRPr lang="nl-NL" sz="2100" dirty="0"/>
+                        </a:p>
+                      </a:txBody>
+                      <a:tcPr>
+                        <a:noFill/>
+                      </a:tcPr>
+                    </a:tc>
+                    <a:tc>
+                      <a:txBody>
+                        <a:bodyPr/>
+                        <a:lstStyle/>
+                        <a:p>
+                          <a:pPr/>
+                          <a14:m>
+                            <m:oMathPara xmlns:m="http://schemas.openxmlformats.org/officeDocument/2006/math">
+                              <m:oMathParaPr>
+                                <m:jc m:val="centerGroup"/>
+                              </m:oMathParaPr>
+                              <m:oMath xmlns:m="http://schemas.openxmlformats.org/officeDocument/2006/math">
+                                <m:r>
+                                  <a:rPr lang="en-GB" sz="2000" b="0" i="1" smtClean="0">
+                                    <a:latin typeface="Cambria Math" panose="02040503050406030204" pitchFamily="18" charset="0"/>
+                                  </a:rPr>
+                                  <m:t>0</m:t>
+                                </m:r>
+                              </m:oMath>
+                            </m:oMathPara>
+                          </a14:m>
+                          <a:endParaRPr lang="nl-NL" sz="2000" dirty="0"/>
+                        </a:p>
+                      </a:txBody>
+                      <a:tcPr>
+                        <a:noFill/>
+                      </a:tcPr>
+                    </a:tc>
+                    <a:tc>
+                      <a:txBody>
+                        <a:bodyPr/>
+                        <a:lstStyle/>
+                        <a:p>
+                          <a:pPr/>
+                          <a14:m>
+                            <m:oMathPara xmlns:m="http://schemas.openxmlformats.org/officeDocument/2006/math">
+                              <m:oMathParaPr>
+                                <m:jc m:val="centerGroup"/>
+                              </m:oMathParaPr>
+                              <m:oMath xmlns:m="http://schemas.openxmlformats.org/officeDocument/2006/math">
+                                <m:r>
+                                  <a:rPr lang="en-GB" sz="2100" b="0" i="1" smtClean="0">
+                                    <a:latin typeface="Cambria Math" panose="02040503050406030204" pitchFamily="18" charset="0"/>
+                                  </a:rPr>
+                                  <m:t>9</m:t>
+                                </m:r>
+                              </m:oMath>
+                            </m:oMathPara>
+                          </a14:m>
+                          <a:endParaRPr lang="nl-NL" sz="2100" dirty="0"/>
+                        </a:p>
+                      </a:txBody>
+                      <a:tcPr>
+                        <a:noFill/>
+                      </a:tcPr>
+                    </a:tc>
+                    <a:tc>
+                      <a:txBody>
+                        <a:bodyPr/>
+                        <a:lstStyle/>
+                        <a:p>
+                          <a:pPr/>
+                          <a14:m>
+                            <m:oMathPara xmlns:m="http://schemas.openxmlformats.org/officeDocument/2006/math">
+                              <m:oMathParaPr>
+                                <m:jc m:val="centerGroup"/>
+                              </m:oMathParaPr>
+                              <m:oMath xmlns:m="http://schemas.openxmlformats.org/officeDocument/2006/math">
+                                <m:r>
+                                  <a:rPr lang="en-GB" sz="2100" b="0" i="1" smtClean="0">
+                                    <a:latin typeface="Cambria Math" panose="02040503050406030204" pitchFamily="18" charset="0"/>
+                                  </a:rPr>
+                                  <m:t>𝑁𝐴</m:t>
+                                </m:r>
+                              </m:oMath>
+                            </m:oMathPara>
+                          </a14:m>
+                          <a:endParaRPr lang="nl-NL" sz="2100" dirty="0"/>
+                        </a:p>
+                      </a:txBody>
+                      <a:tcPr>
+                        <a:noFill/>
+                      </a:tcPr>
+                    </a:tc>
+                    <a:extLst>
+                      <a:ext uri="{0D108BD9-81ED-4DB2-BD59-A6C34878D82A}">
+                        <a16:rowId xmlns:a16="http://schemas.microsoft.com/office/drawing/2014/main" val="2224430632"/>
+                      </a:ext>
+                    </a:extLst>
+                  </a:tr>
+                  <a:tr h="465540">
+                    <a:tc>
+                      <a:txBody>
+                        <a:bodyPr/>
+                        <a:lstStyle/>
+                        <a:p>
+                          <a:pPr/>
+                          <a14:m>
+                            <m:oMathPara xmlns:m="http://schemas.openxmlformats.org/officeDocument/2006/math">
+                              <m:oMathParaPr>
+                                <m:jc m:val="centerGroup"/>
+                              </m:oMathParaPr>
+                              <m:oMath xmlns:m="http://schemas.openxmlformats.org/officeDocument/2006/math">
+                                <m:r>
+                                  <a:rPr lang="en-GB" sz="2100" b="0" i="1" smtClean="0">
+                                    <a:latin typeface="Cambria Math" panose="02040503050406030204" pitchFamily="18" charset="0"/>
+                                  </a:rPr>
+                                  <m:t>3</m:t>
+                                </m:r>
+                              </m:oMath>
+                            </m:oMathPara>
+                          </a14:m>
+                          <a:endParaRPr lang="nl-NL" sz="2100" dirty="0"/>
+                        </a:p>
+                      </a:txBody>
+                      <a:tcPr>
+                        <a:noFill/>
+                      </a:tcPr>
+                    </a:tc>
+                    <a:tc>
+                      <a:txBody>
+                        <a:bodyPr/>
+                        <a:lstStyle/>
+                        <a:p>
+                          <a:pPr/>
+                          <a14:m>
+                            <m:oMathPara xmlns:m="http://schemas.openxmlformats.org/officeDocument/2006/math">
+                              <m:oMathParaPr>
+                                <m:jc m:val="centerGroup"/>
+                              </m:oMathParaPr>
+                              <m:oMath xmlns:m="http://schemas.openxmlformats.org/officeDocument/2006/math">
+                                <m:r>
+                                  <a:rPr lang="en-GB" sz="2100" b="0" i="1" smtClean="0">
+                                    <a:latin typeface="Cambria Math" panose="02040503050406030204" pitchFamily="18" charset="0"/>
+                                  </a:rPr>
+                                  <m:t>6</m:t>
+                                </m:r>
+                              </m:oMath>
+                            </m:oMathPara>
+                          </a14:m>
+                          <a:endParaRPr lang="nl-NL" sz="2100" dirty="0"/>
+                        </a:p>
+                      </a:txBody>
+                      <a:tcPr>
+                        <a:noFill/>
+                      </a:tcPr>
+                    </a:tc>
+                    <a:tc>
+                      <a:txBody>
+                        <a:bodyPr/>
+                        <a:lstStyle/>
+                        <a:p>
+                          <a:pPr/>
+                          <a14:m>
+                            <m:oMathPara xmlns:m="http://schemas.openxmlformats.org/officeDocument/2006/math">
+                              <m:oMathParaPr>
+                                <m:jc m:val="centerGroup"/>
+                              </m:oMathParaPr>
+                              <m:oMath xmlns:m="http://schemas.openxmlformats.org/officeDocument/2006/math">
+                                <m:r>
+                                  <a:rPr lang="en-GB" sz="2000" b="0" i="1" smtClean="0">
+                                    <a:latin typeface="Cambria Math" panose="02040503050406030204" pitchFamily="18" charset="0"/>
+                                  </a:rPr>
+                                  <m:t>0</m:t>
+                                </m:r>
+                              </m:oMath>
+                            </m:oMathPara>
+                          </a14:m>
+                          <a:endParaRPr lang="nl-NL" sz="2000" dirty="0"/>
+                        </a:p>
+                      </a:txBody>
+                      <a:tcPr>
+                        <a:noFill/>
+                      </a:tcPr>
+                    </a:tc>
+                    <a:tc>
+                      <a:txBody>
+                        <a:bodyPr/>
+                        <a:lstStyle/>
+                        <a:p>
+                          <a:pPr/>
+                          <a14:m>
+                            <m:oMathPara xmlns:m="http://schemas.openxmlformats.org/officeDocument/2006/math">
+                              <m:oMathParaPr>
+                                <m:jc m:val="centerGroup"/>
+                              </m:oMathParaPr>
+                              <m:oMath xmlns:m="http://schemas.openxmlformats.org/officeDocument/2006/math">
+                                <m:r>
+                                  <a:rPr lang="en-GB" sz="2100" b="0" i="1" smtClean="0">
+                                    <a:latin typeface="Cambria Math" panose="02040503050406030204" pitchFamily="18" charset="0"/>
+                                  </a:rPr>
+                                  <m:t>6</m:t>
+                                </m:r>
+                              </m:oMath>
+                            </m:oMathPara>
+                          </a14:m>
+                          <a:endParaRPr lang="nl-NL" sz="2100" dirty="0"/>
+                        </a:p>
+                      </a:txBody>
+                      <a:tcPr>
+                        <a:noFill/>
+                      </a:tcPr>
+                    </a:tc>
+                    <a:tc>
+                      <a:txBody>
+                        <a:bodyPr/>
+                        <a:lstStyle/>
+                        <a:p>
+                          <a:pPr/>
+                          <a14:m>
+                            <m:oMathPara xmlns:m="http://schemas.openxmlformats.org/officeDocument/2006/math">
+                              <m:oMathParaPr>
+                                <m:jc m:val="centerGroup"/>
+                              </m:oMathParaPr>
+                              <m:oMath xmlns:m="http://schemas.openxmlformats.org/officeDocument/2006/math">
+                                <m:r>
+                                  <a:rPr lang="en-GB" sz="2100" b="0" i="1" smtClean="0">
+                                    <a:latin typeface="Cambria Math" panose="02040503050406030204" pitchFamily="18" charset="0"/>
+                                  </a:rPr>
+                                  <m:t>𝑁𝐴</m:t>
+                                </m:r>
+                              </m:oMath>
+                            </m:oMathPara>
+                          </a14:m>
+                          <a:endParaRPr lang="nl-NL" sz="2100" dirty="0"/>
+                        </a:p>
+                      </a:txBody>
+                      <a:tcPr>
+                        <a:noFill/>
+                      </a:tcPr>
+                    </a:tc>
+                    <a:extLst>
+                      <a:ext uri="{0D108BD9-81ED-4DB2-BD59-A6C34878D82A}">
+                        <a16:rowId xmlns:a16="http://schemas.microsoft.com/office/drawing/2014/main" val="2346763742"/>
+                      </a:ext>
+                    </a:extLst>
+                  </a:tr>
+                  <a:tr h="465540">
+                    <a:tc>
+                      <a:txBody>
+                        <a:bodyPr/>
+                        <a:lstStyle/>
+                        <a:p>
+                          <a:pPr/>
+                          <a14:m>
+                            <m:oMathPara xmlns:m="http://schemas.openxmlformats.org/officeDocument/2006/math">
+                              <m:oMathParaPr>
+                                <m:jc m:val="centerGroup"/>
+                              </m:oMathParaPr>
+                              <m:oMath xmlns:m="http://schemas.openxmlformats.org/officeDocument/2006/math">
+                                <m:r>
+                                  <a:rPr lang="en-GB" sz="2100" b="0" i="1" smtClean="0">
+                                    <a:latin typeface="Cambria Math" panose="02040503050406030204" pitchFamily="18" charset="0"/>
+                                  </a:rPr>
+                                  <m:t>4</m:t>
+                                </m:r>
+                              </m:oMath>
+                            </m:oMathPara>
+                          </a14:m>
+                          <a:endParaRPr lang="nl-NL" sz="2100" dirty="0"/>
+                        </a:p>
+                      </a:txBody>
+                      <a:tcPr>
+                        <a:noFill/>
+                      </a:tcPr>
+                    </a:tc>
+                    <a:tc>
+                      <a:txBody>
+                        <a:bodyPr/>
+                        <a:lstStyle/>
+                        <a:p>
+                          <a:pPr/>
+                          <a14:m>
+                            <m:oMathPara xmlns:m="http://schemas.openxmlformats.org/officeDocument/2006/math">
+                              <m:oMathParaPr>
+                                <m:jc m:val="centerGroup"/>
+                              </m:oMathParaPr>
+                              <m:oMath xmlns:m="http://schemas.openxmlformats.org/officeDocument/2006/math">
+                                <m:r>
+                                  <a:rPr lang="en-GB" sz="2100" b="0" i="1" smtClean="0">
+                                    <a:latin typeface="Cambria Math" panose="02040503050406030204" pitchFamily="18" charset="0"/>
+                                  </a:rPr>
+                                  <m:t>5</m:t>
+                                </m:r>
+                              </m:oMath>
+                            </m:oMathPara>
+                          </a14:m>
+                          <a:endParaRPr lang="nl-NL" sz="2100" dirty="0"/>
+                        </a:p>
+                      </a:txBody>
+                      <a:tcPr>
+                        <a:noFill/>
+                      </a:tcPr>
+                    </a:tc>
+                    <a:tc>
+                      <a:txBody>
+                        <a:bodyPr/>
+                        <a:lstStyle/>
+                        <a:p>
+                          <a:pPr/>
+                          <a14:m>
+                            <m:oMathPara xmlns:m="http://schemas.openxmlformats.org/officeDocument/2006/math">
+                              <m:oMathParaPr>
+                                <m:jc m:val="centerGroup"/>
+                              </m:oMathParaPr>
+                              <m:oMath xmlns:m="http://schemas.openxmlformats.org/officeDocument/2006/math">
+                                <m:r>
+                                  <a:rPr lang="en-GB" sz="2000" b="0" i="1" smtClean="0">
+                                    <a:latin typeface="Cambria Math" panose="02040503050406030204" pitchFamily="18" charset="0"/>
+                                  </a:rPr>
+                                  <m:t>0</m:t>
+                                </m:r>
+                              </m:oMath>
+                            </m:oMathPara>
+                          </a14:m>
+                          <a:endParaRPr lang="nl-NL" sz="2000" dirty="0"/>
+                        </a:p>
+                      </a:txBody>
+                      <a:tcPr>
+                        <a:noFill/>
+                      </a:tcPr>
+                    </a:tc>
+                    <a:tc>
+                      <a:txBody>
+                        <a:bodyPr/>
+                        <a:lstStyle/>
+                        <a:p>
+                          <a:pPr/>
+                          <a14:m>
+                            <m:oMathPara xmlns:m="http://schemas.openxmlformats.org/officeDocument/2006/math">
+                              <m:oMathParaPr>
+                                <m:jc m:val="centerGroup"/>
+                              </m:oMathParaPr>
+                              <m:oMath xmlns:m="http://schemas.openxmlformats.org/officeDocument/2006/math">
+                                <m:r>
+                                  <a:rPr lang="en-GB" sz="2100" b="0" i="1" smtClean="0">
+                                    <a:latin typeface="Cambria Math" panose="02040503050406030204" pitchFamily="18" charset="0"/>
+                                  </a:rPr>
+                                  <m:t>5</m:t>
+                                </m:r>
+                              </m:oMath>
+                            </m:oMathPara>
+                          </a14:m>
+                          <a:endParaRPr lang="nl-NL" sz="2100" dirty="0"/>
+                        </a:p>
+                      </a:txBody>
+                      <a:tcPr>
+                        <a:noFill/>
+                      </a:tcPr>
+                    </a:tc>
+                    <a:tc>
+                      <a:txBody>
+                        <a:bodyPr/>
+                        <a:lstStyle/>
+                        <a:p>
+                          <a:pPr/>
+                          <a14:m>
+                            <m:oMathPara xmlns:m="http://schemas.openxmlformats.org/officeDocument/2006/math">
+                              <m:oMathParaPr>
+                                <m:jc m:val="centerGroup"/>
+                              </m:oMathParaPr>
+                              <m:oMath xmlns:m="http://schemas.openxmlformats.org/officeDocument/2006/math">
+                                <m:r>
+                                  <a:rPr lang="en-GB" sz="2100" b="0" i="1" smtClean="0">
+                                    <a:latin typeface="Cambria Math" panose="02040503050406030204" pitchFamily="18" charset="0"/>
+                                  </a:rPr>
+                                  <m:t>𝑁𝐴</m:t>
+                                </m:r>
+                              </m:oMath>
+                            </m:oMathPara>
+                          </a14:m>
+                          <a:endParaRPr lang="nl-NL" sz="2100" dirty="0"/>
+                        </a:p>
+                      </a:txBody>
+                      <a:tcPr>
+                        <a:noFill/>
+                      </a:tcPr>
+                    </a:tc>
+                    <a:extLst>
+                      <a:ext uri="{0D108BD9-81ED-4DB2-BD59-A6C34878D82A}">
+                        <a16:rowId xmlns:a16="http://schemas.microsoft.com/office/drawing/2014/main" val="877257161"/>
+                      </a:ext>
+                    </a:extLst>
+                  </a:tr>
+                  <a:tr h="465540">
+                    <a:tc>
+                      <a:txBody>
+                        <a:bodyPr/>
+                        <a:lstStyle/>
+                        <a:p>
+                          <a:pPr/>
+                          <a14:m>
+                            <m:oMathPara xmlns:m="http://schemas.openxmlformats.org/officeDocument/2006/math">
+                              <m:oMathParaPr>
+                                <m:jc m:val="centerGroup"/>
+                              </m:oMathParaPr>
+                              <m:oMath xmlns:m="http://schemas.openxmlformats.org/officeDocument/2006/math">
+                                <m:r>
+                                  <a:rPr lang="en-GB" sz="2100" b="0" i="1" smtClean="0">
+                                    <a:latin typeface="Cambria Math" panose="02040503050406030204" pitchFamily="18" charset="0"/>
+                                  </a:rPr>
+                                  <m:t>5</m:t>
+                                </m:r>
+                              </m:oMath>
+                            </m:oMathPara>
+                          </a14:m>
+                          <a:endParaRPr lang="nl-NL" sz="2100" dirty="0"/>
+                        </a:p>
+                      </a:txBody>
+                      <a:tcPr>
+                        <a:noFill/>
+                      </a:tcPr>
+                    </a:tc>
+                    <a:tc>
+                      <a:txBody>
+                        <a:bodyPr/>
+                        <a:lstStyle/>
+                        <a:p>
+                          <a:pPr/>
+                          <a14:m>
+                            <m:oMathPara xmlns:m="http://schemas.openxmlformats.org/officeDocument/2006/math">
+                              <m:oMathParaPr>
+                                <m:jc m:val="centerGroup"/>
+                              </m:oMathParaPr>
+                              <m:oMath xmlns:m="http://schemas.openxmlformats.org/officeDocument/2006/math">
+                                <m:r>
+                                  <a:rPr lang="en-GB" sz="2100" b="0" i="1" smtClean="0">
+                                    <a:latin typeface="Cambria Math" panose="02040503050406030204" pitchFamily="18" charset="0"/>
+                                  </a:rPr>
+                                  <m:t>6</m:t>
+                                </m:r>
+                              </m:oMath>
+                            </m:oMathPara>
+                          </a14:m>
+                          <a:endParaRPr lang="nl-NL" sz="2100" dirty="0"/>
+                        </a:p>
+                      </a:txBody>
+                      <a:tcPr>
+                        <a:noFill/>
+                      </a:tcPr>
+                    </a:tc>
+                    <a:tc>
+                      <a:txBody>
+                        <a:bodyPr/>
+                        <a:lstStyle/>
+                        <a:p>
+                          <a:pPr/>
+                          <a14:m>
+                            <m:oMathPara xmlns:m="http://schemas.openxmlformats.org/officeDocument/2006/math">
+                              <m:oMathParaPr>
+                                <m:jc m:val="centerGroup"/>
+                              </m:oMathParaPr>
+                              <m:oMath xmlns:m="http://schemas.openxmlformats.org/officeDocument/2006/math">
+                                <m:r>
+                                  <a:rPr lang="en-GB" sz="2000" b="0" i="1" smtClean="0">
+                                    <a:latin typeface="Cambria Math" panose="02040503050406030204" pitchFamily="18" charset="0"/>
+                                  </a:rPr>
+                                  <m:t>0</m:t>
+                                </m:r>
+                              </m:oMath>
+                            </m:oMathPara>
+                          </a14:m>
+                          <a:endParaRPr lang="nl-NL" sz="2000" dirty="0"/>
+                        </a:p>
+                      </a:txBody>
+                      <a:tcPr>
+                        <a:noFill/>
+                      </a:tcPr>
+                    </a:tc>
+                    <a:tc>
+                      <a:txBody>
+                        <a:bodyPr/>
+                        <a:lstStyle/>
+                        <a:p>
+                          <a:pPr/>
+                          <a14:m>
+                            <m:oMathPara xmlns:m="http://schemas.openxmlformats.org/officeDocument/2006/math">
+                              <m:oMathParaPr>
+                                <m:jc m:val="centerGroup"/>
+                              </m:oMathParaPr>
+                              <m:oMath xmlns:m="http://schemas.openxmlformats.org/officeDocument/2006/math">
+                                <m:r>
+                                  <a:rPr lang="en-GB" sz="2100" b="0" i="1" smtClean="0">
+                                    <a:latin typeface="Cambria Math" panose="02040503050406030204" pitchFamily="18" charset="0"/>
+                                  </a:rPr>
+                                  <m:t>6</m:t>
+                                </m:r>
+                              </m:oMath>
+                            </m:oMathPara>
+                          </a14:m>
+                          <a:endParaRPr lang="nl-NL" sz="2100" dirty="0"/>
+                        </a:p>
+                      </a:txBody>
+                      <a:tcPr>
+                        <a:noFill/>
+                      </a:tcPr>
+                    </a:tc>
+                    <a:tc>
+                      <a:txBody>
+                        <a:bodyPr/>
+                        <a:lstStyle/>
+                        <a:p>
+                          <a:pPr/>
+                          <a14:m>
+                            <m:oMathPara xmlns:m="http://schemas.openxmlformats.org/officeDocument/2006/math">
+                              <m:oMathParaPr>
+                                <m:jc m:val="centerGroup"/>
+                              </m:oMathParaPr>
+                              <m:oMath xmlns:m="http://schemas.openxmlformats.org/officeDocument/2006/math">
+                                <m:r>
+                                  <a:rPr lang="en-GB" sz="2100" b="0" i="1" smtClean="0">
+                                    <a:latin typeface="Cambria Math" panose="02040503050406030204" pitchFamily="18" charset="0"/>
+                                  </a:rPr>
+                                  <m:t>𝑁𝐴</m:t>
+                                </m:r>
+                              </m:oMath>
+                            </m:oMathPara>
+                          </a14:m>
+                          <a:endParaRPr lang="nl-NL" sz="2100" dirty="0"/>
+                        </a:p>
+                      </a:txBody>
+                      <a:tcPr>
+                        <a:noFill/>
+                      </a:tcPr>
+                    </a:tc>
+                    <a:extLst>
+                      <a:ext uri="{0D108BD9-81ED-4DB2-BD59-A6C34878D82A}">
+                        <a16:rowId xmlns:a16="http://schemas.microsoft.com/office/drawing/2014/main" val="2496063903"/>
+                      </a:ext>
+                    </a:extLst>
+                  </a:tr>
+                  <a:tr h="465540">
+                    <a:tc>
+                      <a:txBody>
+                        <a:bodyPr/>
+                        <a:lstStyle/>
+                        <a:p>
+                          <a:pPr/>
+                          <a14:m>
+                            <m:oMathPara xmlns:m="http://schemas.openxmlformats.org/officeDocument/2006/math">
+                              <m:oMathParaPr>
+                                <m:jc m:val="centerGroup"/>
+                              </m:oMathParaPr>
+                              <m:oMath xmlns:m="http://schemas.openxmlformats.org/officeDocument/2006/math">
+                                <m:r>
+                                  <a:rPr lang="en-GB" sz="2100" b="0" i="1" smtClean="0">
+                                    <a:latin typeface="Cambria Math" panose="02040503050406030204" pitchFamily="18" charset="0"/>
+                                  </a:rPr>
+                                  <m:t>6</m:t>
+                                </m:r>
+                              </m:oMath>
+                            </m:oMathPara>
+                          </a14:m>
+                          <a:endParaRPr lang="nl-NL" sz="2100" dirty="0"/>
+                        </a:p>
+                      </a:txBody>
+                      <a:tcPr>
+                        <a:noFill/>
+                      </a:tcPr>
+                    </a:tc>
+                    <a:tc>
+                      <a:txBody>
+                        <a:bodyPr/>
+                        <a:lstStyle/>
+                        <a:p>
+                          <a:pPr/>
+                          <a14:m>
+                            <m:oMathPara xmlns:m="http://schemas.openxmlformats.org/officeDocument/2006/math">
+                              <m:oMathParaPr>
+                                <m:jc m:val="centerGroup"/>
+                              </m:oMathParaPr>
+                              <m:oMath xmlns:m="http://schemas.openxmlformats.org/officeDocument/2006/math">
+                                <m:r>
+                                  <a:rPr lang="en-GB" sz="2100" b="0" i="1" smtClean="0">
+                                    <a:latin typeface="Cambria Math" panose="02040503050406030204" pitchFamily="18" charset="0"/>
+                                  </a:rPr>
+                                  <m:t>2</m:t>
+                                </m:r>
+                              </m:oMath>
+                            </m:oMathPara>
+                          </a14:m>
+                          <a:endParaRPr lang="nl-NL" sz="2100" dirty="0"/>
+                        </a:p>
+                      </a:txBody>
+                      <a:tcPr>
+                        <a:noFill/>
+                      </a:tcPr>
+                    </a:tc>
                     <a:tc>
                       <a:txBody>
                         <a:bodyPr/>
@@ -10259,15 +11256,15 @@
                               </m:oMathParaPr>
                               <m:oMath xmlns:m="http://schemas.openxmlformats.org/officeDocument/2006/math">
                                 <m:r>
-                                  <a:rPr lang="en-GB" sz="2000" b="0" i="1" smtClean="0">
+                                  <a:rPr lang="en-GB" sz="2100" b="0" i="1" smtClean="0">
                                     <a:latin typeface="Cambria Math" panose="02040503050406030204" pitchFamily="18" charset="0"/>
                                   </a:rPr>
-                                  <m:t>7</m:t>
+                                  <m:t>𝑁𝐴</m:t>
                                 </m:r>
                               </m:oMath>
                             </m:oMathPara>
                           </a14:m>
-                          <a:endParaRPr lang="nl-NL" sz="2000" dirty="0"/>
+                          <a:endParaRPr lang="nl-NL" sz="2100" dirty="0"/>
                         </a:p>
                       </a:txBody>
                       <a:tcPr>
@@ -10287,15 +11284,15 @@
                               </m:oMathParaPr>
                               <m:oMath xmlns:m="http://schemas.openxmlformats.org/officeDocument/2006/math">
                                 <m:r>
-                                  <a:rPr lang="en-GB" sz="2000" b="0" i="1" smtClean="0">
+                                  <a:rPr lang="en-GB" sz="2100" b="0" i="1" smtClean="0">
                                     <a:latin typeface="Cambria Math" panose="02040503050406030204" pitchFamily="18" charset="0"/>
                                   </a:rPr>
-                                  <m:t>0</m:t>
+                                  <m:t>2</m:t>
                                 </m:r>
                               </m:oMath>
                             </m:oMathPara>
                           </a14:m>
-                          <a:endParaRPr lang="nl-NL" sz="2000" dirty="0"/>
+                          <a:endParaRPr lang="nl-NL" sz="2100" dirty="0"/>
                         </a:p>
                       </a:txBody>
                       <a:tcPr>
@@ -10304,7 +11301,7 @@
                     </a:tc>
                     <a:extLst>
                       <a:ext uri="{0D108BD9-81ED-4DB2-BD59-A6C34878D82A}">
-                        <a16:rowId xmlns:a16="http://schemas.microsoft.com/office/drawing/2014/main" val="390264655"/>
+                        <a16:rowId xmlns:a16="http://schemas.microsoft.com/office/drawing/2014/main" val="305272429"/>
                       </a:ext>
                     </a:extLst>
                   </a:tr>
@@ -10322,15 +11319,15 @@
                               </m:oMathParaPr>
                               <m:oMath xmlns:m="http://schemas.openxmlformats.org/officeDocument/2006/math">
                                 <m:r>
-                                  <a:rPr lang="en-GB" sz="2000" b="0" i="1" smtClean="0">
+                                  <a:rPr lang="en-GB" sz="2100" b="0" i="1" smtClean="0">
                                     <a:latin typeface="Cambria Math" panose="02040503050406030204" pitchFamily="18" charset="0"/>
                                   </a:rPr>
-                                  <m:t>2</m:t>
+                                  <m:t>7</m:t>
                                 </m:r>
                               </m:oMath>
                             </m:oMathPara>
                           </a14:m>
-                          <a:endParaRPr lang="nl-NL" sz="2000" dirty="0"/>
+                          <a:endParaRPr lang="nl-NL" sz="2100" dirty="0"/>
                         </a:p>
                       </a:txBody>
                       <a:tcPr>
@@ -10350,70 +11347,7 @@
                               </m:oMathParaPr>
                               <m:oMath xmlns:m="http://schemas.openxmlformats.org/officeDocument/2006/math">
                                 <m:r>
-                                  <a:rPr lang="en-GB" sz="2000" b="0" i="1" smtClean="0">
-                                    <a:latin typeface="Cambria Math" panose="02040503050406030204" pitchFamily="18" charset="0"/>
-                                  </a:rPr>
-                                  <m:t>9</m:t>
-                                </m:r>
-                              </m:oMath>
-                            </m:oMathPara>
-                          </a14:m>
-                          <a:endParaRPr lang="nl-NL" sz="2000" dirty="0"/>
-                        </a:p>
-                      </a:txBody>
-                      <a:tcPr>
-                        <a:noFill/>
-                      </a:tcPr>
-                    </a:tc>
-                    <a:tc>
-                      <a:txBody>
-                        <a:bodyPr/>
-                        <a:lstStyle/>
-                        <a:p>
-                          <a:pPr/>
-                          <a14:m>
-                            <m:oMathPara xmlns:m="http://schemas.openxmlformats.org/officeDocument/2006/math">
-                              <m:oMathParaPr>
-                                <m:jc m:val="centerGroup"/>
-                              </m:oMathParaPr>
-                              <m:oMath xmlns:m="http://schemas.openxmlformats.org/officeDocument/2006/math">
-                                <m:r>
-                                  <a:rPr lang="en-GB" sz="2000" b="0" i="1" smtClean="0">
-                                    <a:latin typeface="Cambria Math" panose="02040503050406030204" pitchFamily="18" charset="0"/>
-                                  </a:rPr>
-                                  <m:t>0</m:t>
-                                </m:r>
-                              </m:oMath>
-                            </m:oMathPara>
-                          </a14:m>
-                          <a:endParaRPr lang="nl-NL" sz="2000" dirty="0"/>
-                        </a:p>
-                      </a:txBody>
-                      <a:tcPr>
-                        <a:noFill/>
-                      </a:tcPr>
-                    </a:tc>
-                    <a:extLst>
-                      <a:ext uri="{0D108BD9-81ED-4DB2-BD59-A6C34878D82A}">
-                        <a16:rowId xmlns:a16="http://schemas.microsoft.com/office/drawing/2014/main" val="2224430632"/>
-                      </a:ext>
-                    </a:extLst>
-                  </a:tr>
-                  <a:tr h="465540">
-                    <a:tc>
-                      <a:txBody>
-                        <a:bodyPr/>
-                        <a:lstStyle/>
-                        <a:p>
-                          <a:pPr/>
-                          <a14:m>
-                            <m:oMathPara xmlns:m="http://schemas.openxmlformats.org/officeDocument/2006/math">
-                              <m:oMathParaPr>
-                                <m:jc m:val="centerGroup"/>
-                              </m:oMathParaPr>
-                              <m:oMath xmlns:m="http://schemas.openxmlformats.org/officeDocument/2006/math">
-                                <m:r>
-                                  <a:rPr lang="en-GB" sz="2000" b="0" i="1" smtClean="0">
+                                  <a:rPr lang="en-GB" sz="2100" b="0" i="1" smtClean="0">
                                     <a:latin typeface="Cambria Math" panose="02040503050406030204" pitchFamily="18" charset="0"/>
                                   </a:rPr>
                                   <m:t>3</m:t>
@@ -10421,308 +11355,7 @@
                               </m:oMath>
                             </m:oMathPara>
                           </a14:m>
-                          <a:endParaRPr lang="nl-NL" sz="2000" dirty="0"/>
-                        </a:p>
-                      </a:txBody>
-                      <a:tcPr>
-                        <a:noFill/>
-                      </a:tcPr>
-                    </a:tc>
-                    <a:tc>
-                      <a:txBody>
-                        <a:bodyPr/>
-                        <a:lstStyle/>
-                        <a:p>
-                          <a:pPr/>
-                          <a14:m>
-                            <m:oMathPara xmlns:m="http://schemas.openxmlformats.org/officeDocument/2006/math">
-                              <m:oMathParaPr>
-                                <m:jc m:val="centerGroup"/>
-                              </m:oMathParaPr>
-                              <m:oMath xmlns:m="http://schemas.openxmlformats.org/officeDocument/2006/math">
-                                <m:r>
-                                  <a:rPr lang="en-GB" sz="2000" b="0" i="1" smtClean="0">
-                                    <a:latin typeface="Cambria Math" panose="02040503050406030204" pitchFamily="18" charset="0"/>
-                                  </a:rPr>
-                                  <m:t>6</m:t>
-                                </m:r>
-                              </m:oMath>
-                            </m:oMathPara>
-                          </a14:m>
-                          <a:endParaRPr lang="nl-NL" sz="2000" dirty="0"/>
-                        </a:p>
-                      </a:txBody>
-                      <a:tcPr>
-                        <a:noFill/>
-                      </a:tcPr>
-                    </a:tc>
-                    <a:tc>
-                      <a:txBody>
-                        <a:bodyPr/>
-                        <a:lstStyle/>
-                        <a:p>
-                          <a:pPr/>
-                          <a14:m>
-                            <m:oMathPara xmlns:m="http://schemas.openxmlformats.org/officeDocument/2006/math">
-                              <m:oMathParaPr>
-                                <m:jc m:val="centerGroup"/>
-                              </m:oMathParaPr>
-                              <m:oMath xmlns:m="http://schemas.openxmlformats.org/officeDocument/2006/math">
-                                <m:r>
-                                  <a:rPr lang="en-GB" sz="2000" b="0" i="1" smtClean="0">
-                                    <a:latin typeface="Cambria Math" panose="02040503050406030204" pitchFamily="18" charset="0"/>
-                                  </a:rPr>
-                                  <m:t>0</m:t>
-                                </m:r>
-                              </m:oMath>
-                            </m:oMathPara>
-                          </a14:m>
-                          <a:endParaRPr lang="nl-NL" sz="2000" dirty="0"/>
-                        </a:p>
-                      </a:txBody>
-                      <a:tcPr>
-                        <a:noFill/>
-                      </a:tcPr>
-                    </a:tc>
-                    <a:extLst>
-                      <a:ext uri="{0D108BD9-81ED-4DB2-BD59-A6C34878D82A}">
-                        <a16:rowId xmlns:a16="http://schemas.microsoft.com/office/drawing/2014/main" val="2346763742"/>
-                      </a:ext>
-                    </a:extLst>
-                  </a:tr>
-                  <a:tr h="465540">
-                    <a:tc>
-                      <a:txBody>
-                        <a:bodyPr/>
-                        <a:lstStyle/>
-                        <a:p>
-                          <a:pPr/>
-                          <a14:m>
-                            <m:oMathPara xmlns:m="http://schemas.openxmlformats.org/officeDocument/2006/math">
-                              <m:oMathParaPr>
-                                <m:jc m:val="centerGroup"/>
-                              </m:oMathParaPr>
-                              <m:oMath xmlns:m="http://schemas.openxmlformats.org/officeDocument/2006/math">
-                                <m:r>
-                                  <a:rPr lang="en-GB" sz="2000" b="0" i="1" smtClean="0">
-                                    <a:latin typeface="Cambria Math" panose="02040503050406030204" pitchFamily="18" charset="0"/>
-                                  </a:rPr>
-                                  <m:t>4</m:t>
-                                </m:r>
-                              </m:oMath>
-                            </m:oMathPara>
-                          </a14:m>
-                          <a:endParaRPr lang="nl-NL" sz="2000" dirty="0"/>
-                        </a:p>
-                      </a:txBody>
-                      <a:tcPr>
-                        <a:noFill/>
-                      </a:tcPr>
-                    </a:tc>
-                    <a:tc>
-                      <a:txBody>
-                        <a:bodyPr/>
-                        <a:lstStyle/>
-                        <a:p>
-                          <a:pPr/>
-                          <a14:m>
-                            <m:oMathPara xmlns:m="http://schemas.openxmlformats.org/officeDocument/2006/math">
-                              <m:oMathParaPr>
-                                <m:jc m:val="centerGroup"/>
-                              </m:oMathParaPr>
-                              <m:oMath xmlns:m="http://schemas.openxmlformats.org/officeDocument/2006/math">
-                                <m:r>
-                                  <a:rPr lang="en-GB" sz="2000" b="0" i="1" smtClean="0">
-                                    <a:latin typeface="Cambria Math" panose="02040503050406030204" pitchFamily="18" charset="0"/>
-                                  </a:rPr>
-                                  <m:t>5</m:t>
-                                </m:r>
-                              </m:oMath>
-                            </m:oMathPara>
-                          </a14:m>
-                          <a:endParaRPr lang="nl-NL" sz="2000" dirty="0"/>
-                        </a:p>
-                      </a:txBody>
-                      <a:tcPr>
-                        <a:noFill/>
-                      </a:tcPr>
-                    </a:tc>
-                    <a:tc>
-                      <a:txBody>
-                        <a:bodyPr/>
-                        <a:lstStyle/>
-                        <a:p>
-                          <a:pPr/>
-                          <a14:m>
-                            <m:oMathPara xmlns:m="http://schemas.openxmlformats.org/officeDocument/2006/math">
-                              <m:oMathParaPr>
-                                <m:jc m:val="centerGroup"/>
-                              </m:oMathParaPr>
-                              <m:oMath xmlns:m="http://schemas.openxmlformats.org/officeDocument/2006/math">
-                                <m:r>
-                                  <a:rPr lang="en-GB" sz="2000" b="0" i="1" smtClean="0">
-                                    <a:latin typeface="Cambria Math" panose="02040503050406030204" pitchFamily="18" charset="0"/>
-                                  </a:rPr>
-                                  <m:t>0</m:t>
-                                </m:r>
-                              </m:oMath>
-                            </m:oMathPara>
-                          </a14:m>
-                          <a:endParaRPr lang="nl-NL" sz="2000" dirty="0"/>
-                        </a:p>
-                      </a:txBody>
-                      <a:tcPr>
-                        <a:noFill/>
-                      </a:tcPr>
-                    </a:tc>
-                    <a:extLst>
-                      <a:ext uri="{0D108BD9-81ED-4DB2-BD59-A6C34878D82A}">
-                        <a16:rowId xmlns:a16="http://schemas.microsoft.com/office/drawing/2014/main" val="877257161"/>
-                      </a:ext>
-                    </a:extLst>
-                  </a:tr>
-                  <a:tr h="465540">
-                    <a:tc>
-                      <a:txBody>
-                        <a:bodyPr/>
-                        <a:lstStyle/>
-                        <a:p>
-                          <a:pPr/>
-                          <a14:m>
-                            <m:oMathPara xmlns:m="http://schemas.openxmlformats.org/officeDocument/2006/math">
-                              <m:oMathParaPr>
-                                <m:jc m:val="centerGroup"/>
-                              </m:oMathParaPr>
-                              <m:oMath xmlns:m="http://schemas.openxmlformats.org/officeDocument/2006/math">
-                                <m:r>
-                                  <a:rPr lang="en-GB" sz="2000" b="0" i="1" smtClean="0">
-                                    <a:latin typeface="Cambria Math" panose="02040503050406030204" pitchFamily="18" charset="0"/>
-                                  </a:rPr>
-                                  <m:t>5</m:t>
-                                </m:r>
-                              </m:oMath>
-                            </m:oMathPara>
-                          </a14:m>
-                          <a:endParaRPr lang="nl-NL" sz="2000" dirty="0"/>
-                        </a:p>
-                      </a:txBody>
-                      <a:tcPr>
-                        <a:noFill/>
-                      </a:tcPr>
-                    </a:tc>
-                    <a:tc>
-                      <a:txBody>
-                        <a:bodyPr/>
-                        <a:lstStyle/>
-                        <a:p>
-                          <a:pPr/>
-                          <a14:m>
-                            <m:oMathPara xmlns:m="http://schemas.openxmlformats.org/officeDocument/2006/math">
-                              <m:oMathParaPr>
-                                <m:jc m:val="centerGroup"/>
-                              </m:oMathParaPr>
-                              <m:oMath xmlns:m="http://schemas.openxmlformats.org/officeDocument/2006/math">
-                                <m:r>
-                                  <a:rPr lang="en-GB" sz="2000" b="0" i="1" smtClean="0">
-                                    <a:latin typeface="Cambria Math" panose="02040503050406030204" pitchFamily="18" charset="0"/>
-                                  </a:rPr>
-                                  <m:t>6</m:t>
-                                </m:r>
-                              </m:oMath>
-                            </m:oMathPara>
-                          </a14:m>
-                          <a:endParaRPr lang="nl-NL" sz="2000" dirty="0"/>
-                        </a:p>
-                      </a:txBody>
-                      <a:tcPr>
-                        <a:noFill/>
-                      </a:tcPr>
-                    </a:tc>
-                    <a:tc>
-                      <a:txBody>
-                        <a:bodyPr/>
-                        <a:lstStyle/>
-                        <a:p>
-                          <a:pPr/>
-                          <a14:m>
-                            <m:oMathPara xmlns:m="http://schemas.openxmlformats.org/officeDocument/2006/math">
-                              <m:oMathParaPr>
-                                <m:jc m:val="centerGroup"/>
-                              </m:oMathParaPr>
-                              <m:oMath xmlns:m="http://schemas.openxmlformats.org/officeDocument/2006/math">
-                                <m:r>
-                                  <a:rPr lang="en-GB" sz="2000" b="0" i="1" smtClean="0">
-                                    <a:latin typeface="Cambria Math" panose="02040503050406030204" pitchFamily="18" charset="0"/>
-                                  </a:rPr>
-                                  <m:t>0</m:t>
-                                </m:r>
-                              </m:oMath>
-                            </m:oMathPara>
-                          </a14:m>
-                          <a:endParaRPr lang="nl-NL" sz="2000" dirty="0"/>
-                        </a:p>
-                      </a:txBody>
-                      <a:tcPr>
-                        <a:noFill/>
-                      </a:tcPr>
-                    </a:tc>
-                    <a:extLst>
-                      <a:ext uri="{0D108BD9-81ED-4DB2-BD59-A6C34878D82A}">
-                        <a16:rowId xmlns:a16="http://schemas.microsoft.com/office/drawing/2014/main" val="2496063903"/>
-                      </a:ext>
-                    </a:extLst>
-                  </a:tr>
-                  <a:tr h="465540">
-                    <a:tc>
-                      <a:txBody>
-                        <a:bodyPr/>
-                        <a:lstStyle/>
-                        <a:p>
-                          <a:pPr/>
-                          <a14:m>
-                            <m:oMathPara xmlns:m="http://schemas.openxmlformats.org/officeDocument/2006/math">
-                              <m:oMathParaPr>
-                                <m:jc m:val="centerGroup"/>
-                              </m:oMathParaPr>
-                              <m:oMath xmlns:m="http://schemas.openxmlformats.org/officeDocument/2006/math">
-                                <m:r>
-                                  <a:rPr lang="en-GB" sz="2000" b="0" i="1" smtClean="0">
-                                    <a:latin typeface="Cambria Math" panose="02040503050406030204" pitchFamily="18" charset="0"/>
-                                  </a:rPr>
-                                  <m:t>6</m:t>
-                                </m:r>
-                              </m:oMath>
-                            </m:oMathPara>
-                          </a14:m>
-                          <a:endParaRPr lang="nl-NL" sz="2000" dirty="0"/>
-                        </a:p>
-                      </a:txBody>
-                      <a:tcPr>
-                        <a:noFill/>
-                      </a:tcPr>
-                    </a:tc>
-                    <a:tc>
-                      <a:txBody>
-                        <a:bodyPr/>
-                        <a:lstStyle/>
-                        <a:p>
-                          <a:pPr/>
-                          <a14:m>
-                            <m:oMathPara xmlns:m="http://schemas.openxmlformats.org/officeDocument/2006/math">
-                              <m:oMathParaPr>
-                                <m:jc m:val="centerGroup"/>
-                              </m:oMathParaPr>
-                              <m:oMath xmlns:m="http://schemas.openxmlformats.org/officeDocument/2006/math">
-                                <m:r>
-                                  <a:rPr lang="en-GB" sz="2000" b="0" i="1" smtClean="0">
-                                    <a:latin typeface="Cambria Math" panose="02040503050406030204" pitchFamily="18" charset="0"/>
-                                  </a:rPr>
-                                  <m:t>2</m:t>
-                                </m:r>
-                              </m:oMath>
-                            </m:oMathPara>
-                          </a14:m>
-                          <a:endParaRPr lang="nl-NL" sz="2000" dirty="0"/>
+                          <a:endParaRPr lang="nl-NL" sz="2100" dirty="0"/>
                         </a:p>
                       </a:txBody>
                       <a:tcPr>
@@ -10757,13 +11390,6 @@
                         <a:noFill/>
                       </a:tcPr>
                     </a:tc>
-                    <a:extLst>
-                      <a:ext uri="{0D108BD9-81ED-4DB2-BD59-A6C34878D82A}">
-                        <a16:rowId xmlns:a16="http://schemas.microsoft.com/office/drawing/2014/main" val="305272429"/>
-                      </a:ext>
-                    </a:extLst>
-                  </a:tr>
-                  <a:tr h="465540">
                     <a:tc>
                       <a:txBody>
                         <a:bodyPr/>
@@ -10777,15 +11403,15 @@
                               </m:oMathParaPr>
                               <m:oMath xmlns:m="http://schemas.openxmlformats.org/officeDocument/2006/math">
                                 <m:r>
-                                  <a:rPr lang="en-GB" sz="2000" b="0" i="1" smtClean="0">
+                                  <a:rPr lang="en-GB" sz="2100" b="0" i="1" smtClean="0">
                                     <a:latin typeface="Cambria Math" panose="02040503050406030204" pitchFamily="18" charset="0"/>
                                   </a:rPr>
-                                  <m:t>7</m:t>
+                                  <m:t>𝑁𝐴</m:t>
                                 </m:r>
                               </m:oMath>
                             </m:oMathPara>
                           </a14:m>
-                          <a:endParaRPr lang="nl-NL" sz="2000" dirty="0"/>
+                          <a:endParaRPr lang="nl-NL" sz="2100" dirty="0"/>
                         </a:p>
                       </a:txBody>
                       <a:tcPr>
@@ -10805,7 +11431,7 @@
                               </m:oMathParaPr>
                               <m:oMath xmlns:m="http://schemas.openxmlformats.org/officeDocument/2006/math">
                                 <m:r>
-                                  <a:rPr lang="en-GB" sz="2000" b="0" i="1" smtClean="0">
+                                  <a:rPr lang="en-GB" sz="2100" b="0" i="1" smtClean="0">
                                     <a:latin typeface="Cambria Math" panose="02040503050406030204" pitchFamily="18" charset="0"/>
                                   </a:rPr>
                                   <m:t>3</m:t>
@@ -10813,7 +11439,70 @@
                               </m:oMath>
                             </m:oMathPara>
                           </a14:m>
-                          <a:endParaRPr lang="nl-NL" sz="2000" dirty="0"/>
+                          <a:endParaRPr lang="nl-NL" sz="2100" dirty="0"/>
+                        </a:p>
+                      </a:txBody>
+                      <a:tcPr>
+                        <a:noFill/>
+                      </a:tcPr>
+                    </a:tc>
+                    <a:extLst>
+                      <a:ext uri="{0D108BD9-81ED-4DB2-BD59-A6C34878D82A}">
+                        <a16:rowId xmlns:a16="http://schemas.microsoft.com/office/drawing/2014/main" val="1137048644"/>
+                      </a:ext>
+                    </a:extLst>
+                  </a:tr>
+                  <a:tr h="465540">
+                    <a:tc>
+                      <a:txBody>
+                        <a:bodyPr/>
+                        <a:lstStyle/>
+                        <a:p>
+                          <a:pPr/>
+                          <a14:m>
+                            <m:oMathPara xmlns:m="http://schemas.openxmlformats.org/officeDocument/2006/math">
+                              <m:oMathParaPr>
+                                <m:jc m:val="centerGroup"/>
+                              </m:oMathParaPr>
+                              <m:oMath xmlns:m="http://schemas.openxmlformats.org/officeDocument/2006/math">
+                                <m:r>
+                                  <a:rPr lang="en-GB" sz="2100" b="0" i="1" smtClean="0">
+                                    <a:latin typeface="Cambria Math" panose="02040503050406030204" pitchFamily="18" charset="0"/>
+                                  </a:rPr>
+                                  <m:t>8</m:t>
+                                </m:r>
+                              </m:oMath>
+                            </m:oMathPara>
+                          </a14:m>
+                          <a:endParaRPr lang="nl-NL" sz="2100" dirty="0"/>
+                        </a:p>
+                      </a:txBody>
+                      <a:tcPr>
+                        <a:noFill/>
+                      </a:tcPr>
+                    </a:tc>
+                    <a:tc>
+                      <a:txBody>
+                        <a:bodyPr/>
+                        <a:lstStyle/>
+                        <a:p>
+                          <a:pPr/>
+                          <a14:m>
+                            <m:oMathPara xmlns:m="http://schemas.openxmlformats.org/officeDocument/2006/math">
+                              <m:oMathParaPr>
+                                <m:jc m:val="centerGroup"/>
+                              </m:oMathParaPr>
+                              <m:oMath xmlns:m="http://schemas.openxmlformats.org/officeDocument/2006/math">
+                                <m:r>
+                                  <a:rPr lang="en-GB" sz="2100" b="0" i="1" smtClean="0">
+                                    <a:latin typeface="Cambria Math" panose="02040503050406030204" pitchFamily="18" charset="0"/>
+                                  </a:rPr>
+                                  <m:t>1</m:t>
+                                </m:r>
+                              </m:oMath>
+                            </m:oMathPara>
+                          </a14:m>
+                          <a:endParaRPr lang="nl-NL" sz="2100" dirty="0"/>
                         </a:p>
                       </a:txBody>
                       <a:tcPr>
@@ -10848,13 +11537,125 @@
                         <a:noFill/>
                       </a:tcPr>
                     </a:tc>
+                    <a:tc>
+                      <a:txBody>
+                        <a:bodyPr/>
+                        <a:lstStyle/>
+                        <a:p>
+                          <a:pPr/>
+                          <a14:m>
+                            <m:oMathPara xmlns:m="http://schemas.openxmlformats.org/officeDocument/2006/math">
+                              <m:oMathParaPr>
+                                <m:jc m:val="centerGroup"/>
+                              </m:oMathParaPr>
+                              <m:oMath xmlns:m="http://schemas.openxmlformats.org/officeDocument/2006/math">
+                                <m:r>
+                                  <a:rPr lang="en-GB" sz="2100" b="0" i="1" smtClean="0">
+                                    <a:latin typeface="Cambria Math" panose="02040503050406030204" pitchFamily="18" charset="0"/>
+                                  </a:rPr>
+                                  <m:t>𝑁𝐴</m:t>
+                                </m:r>
+                              </m:oMath>
+                            </m:oMathPara>
+                          </a14:m>
+                          <a:endParaRPr lang="nl-NL" sz="2100" dirty="0"/>
+                        </a:p>
+                      </a:txBody>
+                      <a:tcPr>
+                        <a:noFill/>
+                      </a:tcPr>
+                    </a:tc>
+                    <a:tc>
+                      <a:txBody>
+                        <a:bodyPr/>
+                        <a:lstStyle/>
+                        <a:p>
+                          <a:pPr/>
+                          <a14:m>
+                            <m:oMathPara xmlns:m="http://schemas.openxmlformats.org/officeDocument/2006/math">
+                              <m:oMathParaPr>
+                                <m:jc m:val="centerGroup"/>
+                              </m:oMathParaPr>
+                              <m:oMath xmlns:m="http://schemas.openxmlformats.org/officeDocument/2006/math">
+                                <m:r>
+                                  <a:rPr lang="en-GB" sz="2100" b="0" i="1" smtClean="0">
+                                    <a:latin typeface="Cambria Math" panose="02040503050406030204" pitchFamily="18" charset="0"/>
+                                  </a:rPr>
+                                  <m:t>1</m:t>
+                                </m:r>
+                              </m:oMath>
+                            </m:oMathPara>
+                          </a14:m>
+                          <a:endParaRPr lang="nl-NL" sz="2100" dirty="0"/>
+                        </a:p>
+                      </a:txBody>
+                      <a:tcPr>
+                        <a:noFill/>
+                      </a:tcPr>
+                    </a:tc>
                     <a:extLst>
                       <a:ext uri="{0D108BD9-81ED-4DB2-BD59-A6C34878D82A}">
-                        <a16:rowId xmlns:a16="http://schemas.microsoft.com/office/drawing/2014/main" val="1137048644"/>
+                        <a16:rowId xmlns:a16="http://schemas.microsoft.com/office/drawing/2014/main" val="1712240706"/>
                       </a:ext>
                     </a:extLst>
                   </a:tr>
                   <a:tr h="465540">
+                    <a:tc>
+                      <a:txBody>
+                        <a:bodyPr/>
+                        <a:lstStyle/>
+                        <a:p>
+                          <a:pPr/>
+                          <a14:m>
+                            <m:oMathPara xmlns:m="http://schemas.openxmlformats.org/officeDocument/2006/math">
+                              <m:oMathParaPr>
+                                <m:jc m:val="centerGroup"/>
+                              </m:oMathParaPr>
+                              <m:oMath xmlns:m="http://schemas.openxmlformats.org/officeDocument/2006/math">
+                                <m:r>
+                                  <a:rPr lang="en-GB" sz="2100" b="0" i="1" smtClean="0">
+                                    <a:latin typeface="Cambria Math" panose="02040503050406030204" pitchFamily="18" charset="0"/>
+                                  </a:rPr>
+                                  <m:t>…</m:t>
+                                </m:r>
+                              </m:oMath>
+                            </m:oMathPara>
+                          </a14:m>
+                          <a:endParaRPr lang="nl-NL" sz="2100" dirty="0"/>
+                        </a:p>
+                      </a:txBody>
+                      <a:tcPr>
+                        <a:noFill/>
+                      </a:tcPr>
+                    </a:tc>
+                    <a:tc>
+                      <a:txBody>
+                        <a:bodyPr/>
+                        <a:lstStyle/>
+                        <a:p>
+                          <a:pPr/>
+                          <a14:m>
+                            <m:oMathPara xmlns:m="http://schemas.openxmlformats.org/officeDocument/2006/math">
+                              <m:oMathParaPr>
+                                <m:jc m:val="centerGroup"/>
+                              </m:oMathParaPr>
+                              <m:oMath xmlns:m="http://schemas.openxmlformats.org/officeDocument/2006/math">
+                                <m:r>
+                                  <a:rPr lang="en-GB" sz="2100" b="0" i="1" smtClean="0">
+                                    <a:latin typeface="Cambria Math" panose="02040503050406030204" pitchFamily="18" charset="0"/>
+                                  </a:rPr>
+                                  <m:t>…</m:t>
+                                </m:r>
+                              </m:oMath>
+                            </m:oMathPara>
+                          </a14:m>
+                          <a:endParaRPr lang="nl-NL" sz="2100" dirty="0"/>
+                        </a:p>
+                      </a:txBody>
+                      <a:tcPr>
+                        <a:noFill/>
+                      </a:tcPr>
+                    </a:tc>
                     <a:tc>
                       <a:txBody>
                         <a:bodyPr/>
@@ -10871,12 +11672,131 @@
                                   <a:rPr lang="en-GB" sz="2000" b="0" i="1" smtClean="0">
                                     <a:latin typeface="Cambria Math" panose="02040503050406030204" pitchFamily="18" charset="0"/>
                                   </a:rPr>
-                                  <m:t>8</m:t>
+                                  <m:t>…</m:t>
                                 </m:r>
                               </m:oMath>
                             </m:oMathPara>
                           </a14:m>
                           <a:endParaRPr lang="nl-NL" sz="2000" dirty="0"/>
+                        </a:p>
+                      </a:txBody>
+                      <a:tcPr>
+                        <a:noFill/>
+                      </a:tcPr>
+                    </a:tc>
+                    <a:tc>
+                      <a:txBody>
+                        <a:bodyPr/>
+                        <a:lstStyle/>
+                        <a:p>
+                          <a:pPr/>
+                          <a14:m>
+                            <m:oMathPara xmlns:m="http://schemas.openxmlformats.org/officeDocument/2006/math">
+                              <m:oMathParaPr>
+                                <m:jc m:val="centerGroup"/>
+                              </m:oMathParaPr>
+                              <m:oMath xmlns:m="http://schemas.openxmlformats.org/officeDocument/2006/math">
+                                <m:r>
+                                  <a:rPr lang="en-GB" sz="2100" b="0" i="1" smtClean="0">
+                                    <a:latin typeface="Cambria Math" panose="02040503050406030204" pitchFamily="18" charset="0"/>
+                                  </a:rPr>
+                                  <m:t>...</m:t>
+                                </m:r>
+                              </m:oMath>
+                            </m:oMathPara>
+                          </a14:m>
+                          <a:endParaRPr lang="nl-NL" sz="2100" dirty="0"/>
+                        </a:p>
+                      </a:txBody>
+                      <a:tcPr>
+                        <a:noFill/>
+                      </a:tcPr>
+                    </a:tc>
+                    <a:tc>
+                      <a:txBody>
+                        <a:bodyPr/>
+                        <a:lstStyle/>
+                        <a:p>
+                          <a:pPr/>
+                          <a14:m>
+                            <m:oMathPara xmlns:m="http://schemas.openxmlformats.org/officeDocument/2006/math">
+                              <m:oMathParaPr>
+                                <m:jc m:val="centerGroup"/>
+                              </m:oMathParaPr>
+                              <m:oMath xmlns:m="http://schemas.openxmlformats.org/officeDocument/2006/math">
+                                <m:r>
+                                  <a:rPr lang="en-GB" sz="2100" b="0" i="1" smtClean="0">
+                                    <a:latin typeface="Cambria Math" panose="02040503050406030204" pitchFamily="18" charset="0"/>
+                                  </a:rPr>
+                                  <m:t>…</m:t>
+                                </m:r>
+                              </m:oMath>
+                            </m:oMathPara>
+                          </a14:m>
+                          <a:endParaRPr lang="nl-NL" sz="2100" dirty="0"/>
+                        </a:p>
+                      </a:txBody>
+                      <a:tcPr>
+                        <a:noFill/>
+                      </a:tcPr>
+                    </a:tc>
+                    <a:extLst>
+                      <a:ext uri="{0D108BD9-81ED-4DB2-BD59-A6C34878D82A}">
+                        <a16:rowId xmlns:a16="http://schemas.microsoft.com/office/drawing/2014/main" val="1201809782"/>
+                      </a:ext>
+                    </a:extLst>
+                  </a:tr>
+                  <a:tr h="465540">
+                    <a:tc>
+                      <a:txBody>
+                        <a:bodyPr/>
+                        <a:lstStyle/>
+                        <a:p>
+                          <a:pPr/>
+                          <a14:m>
+                            <m:oMathPara xmlns:m="http://schemas.openxmlformats.org/officeDocument/2006/math">
+                              <m:oMathParaPr>
+                                <m:jc m:val="centerGroup"/>
+                              </m:oMathParaPr>
+                              <m:oMath xmlns:m="http://schemas.openxmlformats.org/officeDocument/2006/math">
+                                <m:r>
+                                  <a:rPr lang="en-GB" sz="2100" b="0" i="1" smtClean="0">
+                                    <a:latin typeface="Cambria Math" panose="02040503050406030204" pitchFamily="18" charset="0"/>
+                                  </a:rPr>
+                                  <m:t>𝐼</m:t>
+                                </m:r>
+                              </m:oMath>
+                            </m:oMathPara>
+                          </a14:m>
+                          <a:endParaRPr lang="nl-NL" sz="2100" dirty="0"/>
+                        </a:p>
+                      </a:txBody>
+                      <a:tcPr>
+                        <a:noFill/>
+                      </a:tcPr>
+                    </a:tc>
+                    <a:tc>
+                      <a:txBody>
+                        <a:bodyPr/>
+                        <a:lstStyle/>
+                        <a:p>
+                          <a:pPr/>
+                          <a14:m>
+                            <m:oMathPara xmlns:m="http://schemas.openxmlformats.org/officeDocument/2006/math">
+                              <m:oMathParaPr>
+                                <m:jc m:val="centerGroup"/>
+                              </m:oMathParaPr>
+                              <m:oMath xmlns:m="http://schemas.openxmlformats.org/officeDocument/2006/math">
+                                <m:r>
+                                  <a:rPr lang="en-GB" sz="2100" b="0" i="1" smtClean="0">
+                                    <a:latin typeface="Cambria Math" panose="02040503050406030204" pitchFamily="18" charset="0"/>
+                                  </a:rPr>
+                                  <m:t>2</m:t>
+                                </m:r>
+                              </m:oMath>
+                            </m:oMathPara>
+                          </a14:m>
+                          <a:endParaRPr lang="nl-NL" sz="2100" dirty="0"/>
                         </a:p>
                       </a:txBody>
                       <a:tcPr>
@@ -10924,28 +11844,21 @@
                               </m:oMathParaPr>
                               <m:oMath xmlns:m="http://schemas.openxmlformats.org/officeDocument/2006/math">
                                 <m:r>
-                                  <a:rPr lang="en-GB" sz="2000" b="0" i="1" smtClean="0">
+                                  <a:rPr lang="en-GB" sz="2100" b="0" i="1" smtClean="0">
                                     <a:latin typeface="Cambria Math" panose="02040503050406030204" pitchFamily="18" charset="0"/>
                                   </a:rPr>
-                                  <m:t>1</m:t>
+                                  <m:t>𝑁𝐴</m:t>
                                 </m:r>
                               </m:oMath>
                             </m:oMathPara>
                           </a14:m>
-                          <a:endParaRPr lang="nl-NL" sz="2000" dirty="0"/>
-                        </a:p>
-                      </a:txBody>
-                      <a:tcPr>
-                        <a:noFill/>
-                      </a:tcPr>
-                    </a:tc>
-                    <a:extLst>
-                      <a:ext uri="{0D108BD9-81ED-4DB2-BD59-A6C34878D82A}">
-                        <a16:rowId xmlns:a16="http://schemas.microsoft.com/office/drawing/2014/main" val="1712240706"/>
-                      </a:ext>
-                    </a:extLst>
-                  </a:tr>
-                  <a:tr h="465540">
+                          <a:endParaRPr lang="nl-NL" sz="2100" dirty="0"/>
+                        </a:p>
+                      </a:txBody>
+                      <a:tcPr>
+                        <a:noFill/>
+                      </a:tcPr>
+                    </a:tc>
                     <a:tc>
                       <a:txBody>
                         <a:bodyPr/>
@@ -10959,126 +11872,7 @@
                               </m:oMathParaPr>
                               <m:oMath xmlns:m="http://schemas.openxmlformats.org/officeDocument/2006/math">
                                 <m:r>
-                                  <a:rPr lang="en-GB" sz="2000" b="0" i="1" smtClean="0">
-                                    <a:latin typeface="Cambria Math" panose="02040503050406030204" pitchFamily="18" charset="0"/>
-                                  </a:rPr>
-                                  <m:t>…</m:t>
-                                </m:r>
-                              </m:oMath>
-                            </m:oMathPara>
-                          </a14:m>
-                          <a:endParaRPr lang="nl-NL" sz="2000" dirty="0"/>
-                        </a:p>
-                      </a:txBody>
-                      <a:tcPr>
-                        <a:noFill/>
-                      </a:tcPr>
-                    </a:tc>
-                    <a:tc>
-                      <a:txBody>
-                        <a:bodyPr/>
-                        <a:lstStyle/>
-                        <a:p>
-                          <a:pPr/>
-                          <a14:m>
-                            <m:oMathPara xmlns:m="http://schemas.openxmlformats.org/officeDocument/2006/math">
-                              <m:oMathParaPr>
-                                <m:jc m:val="centerGroup"/>
-                              </m:oMathParaPr>
-                              <m:oMath xmlns:m="http://schemas.openxmlformats.org/officeDocument/2006/math">
-                                <m:r>
-                                  <a:rPr lang="en-GB" sz="2000" b="0" i="1" smtClean="0">
-                                    <a:latin typeface="Cambria Math" panose="02040503050406030204" pitchFamily="18" charset="0"/>
-                                  </a:rPr>
-                                  <m:t>…</m:t>
-                                </m:r>
-                              </m:oMath>
-                            </m:oMathPara>
-                          </a14:m>
-                          <a:endParaRPr lang="nl-NL" sz="2000" dirty="0"/>
-                        </a:p>
-                      </a:txBody>
-                      <a:tcPr>
-                        <a:noFill/>
-                      </a:tcPr>
-                    </a:tc>
-                    <a:tc>
-                      <a:txBody>
-                        <a:bodyPr/>
-                        <a:lstStyle/>
-                        <a:p>
-                          <a:pPr/>
-                          <a14:m>
-                            <m:oMathPara xmlns:m="http://schemas.openxmlformats.org/officeDocument/2006/math">
-                              <m:oMathParaPr>
-                                <m:jc m:val="centerGroup"/>
-                              </m:oMathParaPr>
-                              <m:oMath xmlns:m="http://schemas.openxmlformats.org/officeDocument/2006/math">
-                                <m:r>
-                                  <a:rPr lang="en-GB" sz="2000" b="0" i="1" smtClean="0">
-                                    <a:latin typeface="Cambria Math" panose="02040503050406030204" pitchFamily="18" charset="0"/>
-                                  </a:rPr>
-                                  <m:t>…</m:t>
-                                </m:r>
-                              </m:oMath>
-                            </m:oMathPara>
-                          </a14:m>
-                          <a:endParaRPr lang="nl-NL" sz="2000" dirty="0"/>
-                        </a:p>
-                      </a:txBody>
-                      <a:tcPr>
-                        <a:noFill/>
-                      </a:tcPr>
-                    </a:tc>
-                    <a:extLst>
-                      <a:ext uri="{0D108BD9-81ED-4DB2-BD59-A6C34878D82A}">
-                        <a16:rowId xmlns:a16="http://schemas.microsoft.com/office/drawing/2014/main" val="1201809782"/>
-                      </a:ext>
-                    </a:extLst>
-                  </a:tr>
-                  <a:tr h="465540">
-                    <a:tc>
-                      <a:txBody>
-                        <a:bodyPr/>
-                        <a:lstStyle/>
-                        <a:p>
-                          <a:pPr/>
-                          <a14:m>
-                            <m:oMathPara xmlns:m="http://schemas.openxmlformats.org/officeDocument/2006/math">
-                              <m:oMathParaPr>
-                                <m:jc m:val="centerGroup"/>
-                              </m:oMathParaPr>
-                              <m:oMath xmlns:m="http://schemas.openxmlformats.org/officeDocument/2006/math">
-                                <m:r>
-                                  <a:rPr lang="en-GB" sz="2000" b="0" i="1" smtClean="0">
-                                    <a:latin typeface="Cambria Math" panose="02040503050406030204" pitchFamily="18" charset="0"/>
-                                  </a:rPr>
-                                  <m:t>𝐼</m:t>
-                                </m:r>
-                              </m:oMath>
-                            </m:oMathPara>
-                          </a14:m>
-                          <a:endParaRPr lang="nl-NL" sz="2000" dirty="0"/>
-                        </a:p>
-                      </a:txBody>
-                      <a:tcPr>
-                        <a:noFill/>
-                      </a:tcPr>
-                    </a:tc>
-                    <a:tc>
-                      <a:txBody>
-                        <a:bodyPr/>
-                        <a:lstStyle/>
-                        <a:p>
-                          <a:pPr/>
-                          <a14:m>
-                            <m:oMathPara xmlns:m="http://schemas.openxmlformats.org/officeDocument/2006/math">
-                              <m:oMathParaPr>
-                                <m:jc m:val="centerGroup"/>
-                              </m:oMathParaPr>
-                              <m:oMath xmlns:m="http://schemas.openxmlformats.org/officeDocument/2006/math">
-                                <m:r>
-                                  <a:rPr lang="en-GB" sz="2000" b="0" i="1" smtClean="0">
+                                  <a:rPr lang="en-GB" sz="2100" b="0" i="1" smtClean="0">
                                     <a:latin typeface="Cambria Math" panose="02040503050406030204" pitchFamily="18" charset="0"/>
                                   </a:rPr>
                                   <m:t>2</m:t>
@@ -11086,35 +11880,7 @@
                               </m:oMath>
                             </m:oMathPara>
                           </a14:m>
-                          <a:endParaRPr lang="nl-NL" sz="2000" dirty="0"/>
-                        </a:p>
-                      </a:txBody>
-                      <a:tcPr>
-                        <a:noFill/>
-                      </a:tcPr>
-                    </a:tc>
-                    <a:tc>
-                      <a:txBody>
-                        <a:bodyPr/>
-                        <a:lstStyle/>
-                        <a:p>
-                          <a:pPr/>
-                          <a14:m>
-                            <m:oMathPara xmlns:m="http://schemas.openxmlformats.org/officeDocument/2006/math">
-                              <m:oMathParaPr>
-                                <m:jc m:val="centerGroup"/>
-                              </m:oMathParaPr>
-                              <m:oMath xmlns:m="http://schemas.openxmlformats.org/officeDocument/2006/math">
-                                <m:r>
-                                  <a:rPr lang="en-GB" sz="2000" b="0" i="1" smtClean="0">
-                                    <a:latin typeface="Cambria Math" panose="02040503050406030204" pitchFamily="18" charset="0"/>
-                                  </a:rPr>
-                                  <m:t>1</m:t>
-                                </m:r>
-                              </m:oMath>
-                            </m:oMathPara>
-                          </a14:m>
-                          <a:endParaRPr lang="nl-NL" sz="2000" dirty="0"/>
+                          <a:endParaRPr lang="nl-NL" sz="2100" dirty="0"/>
                         </a:p>
                       </a:txBody>
                       <a:tcPr>
@@ -11132,30 +11898,24 @@
             </a:graphic>
           </p:graphicFrame>
         </mc:Choice>
-        <mc:Fallback xmlns="">
+        <mc:Fallback>
           <p:graphicFrame>
             <p:nvGraphicFramePr>
-              <p:cNvPr id="6" name="Table 6">
+              <p:cNvPr id="3" name="Table 6">
                 <a:extLst>
                   <a:ext uri="{FF2B5EF4-FFF2-40B4-BE49-F238E27FC236}">
-                    <a16:creationId xmlns:a16="http://schemas.microsoft.com/office/drawing/2014/main" id="{F72BD6FC-4ED6-91E7-9B54-BC44BC9F7934}"/>
+                    <a16:creationId xmlns:a16="http://schemas.microsoft.com/office/drawing/2014/main" id="{7F5D5E0C-E332-687C-116D-5583F775151D}"/>
                   </a:ext>
                 </a:extLst>
               </p:cNvPr>
               <p:cNvGraphicFramePr>
                 <a:graphicFrameLocks noGrp="1"/>
               </p:cNvGraphicFramePr>
-              <p:nvPr>
-                <p:extLst>
-                  <p:ext uri="{D42A27DB-BD31-4B8C-83A1-F6EECF244321}">
-                    <p14:modId xmlns:p14="http://schemas.microsoft.com/office/powerpoint/2010/main" val="1725799929"/>
-                  </p:ext>
-                </p:extLst>
-              </p:nvPr>
+              <p:nvPr/>
             </p:nvGraphicFramePr>
             <p:xfrm>
-              <a:off x="1752600" y="989045"/>
-              <a:ext cx="4874064" cy="5587801"/>
+              <a:off x="1748347" y="989045"/>
+              <a:ext cx="8123440" cy="5587802"/>
             </p:xfrm>
             <a:graphic>
               <a:graphicData uri="http://schemas.openxmlformats.org/drawingml/2006/table">
@@ -11185,6 +11945,20 @@
                         </a:ext>
                       </a:extLst>
                     </a:gridCol>
+                    <a:gridCol w="1624688">
+                      <a:extLst>
+                        <a:ext uri="{9D8B030D-6E8A-4147-A177-3AD203B41FA5}">
+                          <a16:colId xmlns:a16="http://schemas.microsoft.com/office/drawing/2014/main" val="2809065463"/>
+                        </a:ext>
+                      </a:extLst>
+                    </a:gridCol>
+                    <a:gridCol w="1624688">
+                      <a:extLst>
+                        <a:ext uri="{9D8B030D-6E8A-4147-A177-3AD203B41FA5}">
+                          <a16:colId xmlns:a16="http://schemas.microsoft.com/office/drawing/2014/main" val="3102601274"/>
+                        </a:ext>
+                      </a:extLst>
+                    </a:gridCol>
                   </a:tblGrid>
                   <a:tr h="414241">
                     <a:tc>
@@ -11192,7 +11966,7 @@
                         <a:bodyPr/>
                         <a:lstStyle/>
                         <a:p>
-                          <a:endParaRPr lang="nl-NL" dirty="0"/>
+                          <a:endParaRPr lang="nl-NL" sz="1900" dirty="0"/>
                         </a:p>
                       </a:txBody>
                       <a:tcPr>
@@ -11237,7 +12011,7 @@
                         <a:bodyPr/>
                         <a:lstStyle/>
                         <a:p>
-                          <a:endParaRPr lang="nl-NL" dirty="0"/>
+                          <a:endParaRPr lang="nl-NL" sz="1900" dirty="0"/>
                         </a:p>
                       </a:txBody>
                       <a:tcPr>
@@ -11279,7 +12053,7 @@
                         <a:bodyPr/>
                         <a:lstStyle/>
                         <a:p>
-                          <a:endParaRPr lang="nl-NL" dirty="0"/>
+                          <a:endParaRPr lang="nl-NL" sz="1900" dirty="0"/>
                         </a:p>
                       </a:txBody>
                       <a:tcPr>
@@ -11290,6 +12064,96 @@
                         <a:lnR w="12700" cmpd="sng">
                           <a:noFill/>
                           <a:prstDash val="solid"/>
+                        </a:lnR>
+                        <a:lnT w="12701" cap="flat" cmpd="sng" algn="ctr">
+                          <a:noFill/>
+                          <a:prstDash val="solid"/>
+                          <a:round/>
+                          <a:headEnd type="none" w="med" len="med"/>
+                          <a:tailEnd type="none" w="med" len="med"/>
+                        </a:lnT>
+                        <a:lnB w="38103" cap="flat" cmpd="sng" algn="ctr">
+                          <a:noFill/>
+                          <a:prstDash val="solid"/>
+                          <a:round/>
+                          <a:headEnd type="none" w="med" len="med"/>
+                          <a:tailEnd type="none" w="med" len="med"/>
+                        </a:lnB>
+                        <a:lnTlToBr w="12700" cmpd="sng">
+                          <a:noFill/>
+                          <a:prstDash val="solid"/>
+                        </a:lnTlToBr>
+                        <a:lnBlToTr w="12700" cmpd="sng">
+                          <a:noFill/>
+                          <a:prstDash val="solid"/>
+                        </a:lnBlToTr>
+                        <a:noFill/>
+                      </a:tcPr>
+                    </a:tc>
+                    <a:tc>
+                      <a:txBody>
+                        <a:bodyPr/>
+                        <a:lstStyle/>
+                        <a:p>
+                          <a:endParaRPr lang="nl-NL" sz="1900" dirty="0"/>
+                        </a:p>
+                      </a:txBody>
+                      <a:tcPr>
+                        <a:lnL w="12700" cmpd="sng">
+                          <a:noFill/>
+                          <a:prstDash val="solid"/>
+                        </a:lnL>
+                        <a:lnR w="12701" cap="flat" cmpd="sng" algn="ctr">
+                          <a:noFill/>
+                          <a:prstDash val="solid"/>
+                          <a:round/>
+                          <a:headEnd type="none" w="med" len="med"/>
+                          <a:tailEnd type="none" w="med" len="med"/>
+                        </a:lnR>
+                        <a:lnT w="12701" cap="flat" cmpd="sng" algn="ctr">
+                          <a:noFill/>
+                          <a:prstDash val="solid"/>
+                          <a:round/>
+                          <a:headEnd type="none" w="med" len="med"/>
+                          <a:tailEnd type="none" w="med" len="med"/>
+                        </a:lnT>
+                        <a:lnB w="38103" cap="flat" cmpd="sng" algn="ctr">
+                          <a:noFill/>
+                          <a:prstDash val="solid"/>
+                          <a:round/>
+                          <a:headEnd type="none" w="med" len="med"/>
+                          <a:tailEnd type="none" w="med" len="med"/>
+                        </a:lnB>
+                        <a:lnTlToBr w="12700" cmpd="sng">
+                          <a:noFill/>
+                          <a:prstDash val="solid"/>
+                        </a:lnTlToBr>
+                        <a:lnBlToTr w="12700" cmpd="sng">
+                          <a:noFill/>
+                          <a:prstDash val="solid"/>
+                        </a:lnBlToTr>
+                        <a:noFill/>
+                      </a:tcPr>
+                    </a:tc>
+                    <a:tc>
+                      <a:txBody>
+                        <a:bodyPr/>
+                        <a:lstStyle/>
+                        <a:p>
+                          <a:endParaRPr lang="nl-NL" sz="1900" dirty="0"/>
+                        </a:p>
+                      </a:txBody>
+                      <a:tcPr>
+                        <a:lnL w="12700" cmpd="sng">
+                          <a:noFill/>
+                          <a:prstDash val="solid"/>
+                        </a:lnL>
+                        <a:lnR w="12701" cap="flat" cmpd="sng" algn="ctr">
+                          <a:noFill/>
+                          <a:prstDash val="solid"/>
+                          <a:round/>
+                          <a:headEnd type="none" w="med" len="med"/>
+                          <a:tailEnd type="none" w="med" len="med"/>
                         </a:lnR>
                         <a:lnT w="12701" cap="flat" cmpd="sng" algn="ctr">
                           <a:noFill/>
@@ -11322,7 +12186,7 @@
                       </a:ext>
                     </a:extLst>
                   </a:tr>
-                  <a:tr h="518160">
+                  <a:tr h="518161">
                     <a:tc>
                       <a:txBody>
                         <a:bodyPr/>
@@ -11342,7 +12206,7 @@
                         <a:blipFill>
                           <a:blip r:embed="rId2"/>
                           <a:stretch>
-                            <a:fillRect l="-375" t="-80000" r="-200749" b="-901176"/>
+                            <a:fillRect l="-375" t="-80000" r="-400375" b="-901176"/>
                           </a:stretch>
                         </a:blipFill>
                       </a:tcPr>
@@ -11366,7 +12230,7 @@
                         <a:blipFill>
                           <a:blip r:embed="rId2"/>
                           <a:stretch>
-                            <a:fillRect l="-100375" t="-80000" r="-100749" b="-901176"/>
+                            <a:fillRect l="-100375" t="-80000" r="-300375" b="-901176"/>
                           </a:stretch>
                         </a:blipFill>
                       </a:tcPr>
@@ -11390,7 +12254,55 @@
                         <a:blipFill>
                           <a:blip r:embed="rId2"/>
                           <a:stretch>
-                            <a:fillRect l="-200375" t="-80000" r="-749" b="-901176"/>
+                            <a:fillRect l="-201128" t="-80000" r="-201504" b="-901176"/>
+                          </a:stretch>
+                        </a:blipFill>
+                      </a:tcPr>
+                    </a:tc>
+                    <a:tc>
+                      <a:txBody>
+                        <a:bodyPr/>
+                        <a:lstStyle/>
+                        <a:p>
+                          <a:endParaRPr lang="nl-NL"/>
+                        </a:p>
+                      </a:txBody>
+                      <a:tcPr>
+                        <a:lnT w="38103" cap="flat" cmpd="sng" algn="ctr">
+                          <a:noFill/>
+                          <a:prstDash val="solid"/>
+                          <a:round/>
+                          <a:headEnd type="none" w="med" len="med"/>
+                          <a:tailEnd type="none" w="med" len="med"/>
+                        </a:lnT>
+                        <a:blipFill>
+                          <a:blip r:embed="rId2"/>
+                          <a:stretch>
+                            <a:fillRect l="-300000" t="-80000" r="-100749" b="-901176"/>
+                          </a:stretch>
+                        </a:blipFill>
+                      </a:tcPr>
+                    </a:tc>
+                    <a:tc>
+                      <a:txBody>
+                        <a:bodyPr/>
+                        <a:lstStyle/>
+                        <a:p>
+                          <a:endParaRPr lang="nl-NL"/>
+                        </a:p>
+                      </a:txBody>
+                      <a:tcPr>
+                        <a:lnT w="38103" cap="flat" cmpd="sng" algn="ctr">
+                          <a:noFill/>
+                          <a:prstDash val="solid"/>
+                          <a:round/>
+                          <a:headEnd type="none" w="med" len="med"/>
+                          <a:tailEnd type="none" w="med" len="med"/>
+                        </a:lnT>
+                        <a:blipFill>
+                          <a:blip r:embed="rId2"/>
+                          <a:stretch>
+                            <a:fillRect l="-400000" t="-80000" r="-749" b="-901176"/>
                           </a:stretch>
                         </a:blipFill>
                       </a:tcPr>
@@ -11414,7 +12326,7 @@
                         <a:blipFill>
                           <a:blip r:embed="rId2"/>
                           <a:stretch>
-                            <a:fillRect l="-375" t="-201316" r="-200749" b="-907895"/>
+                            <a:fillRect l="-375" t="-201316" r="-400375" b="-907895"/>
                           </a:stretch>
                         </a:blipFill>
                       </a:tcPr>
@@ -11431,7 +12343,7 @@
                         <a:blipFill>
                           <a:blip r:embed="rId2"/>
                           <a:stretch>
-                            <a:fillRect l="-100375" t="-201316" r="-100749" b="-907895"/>
+                            <a:fillRect l="-100375" t="-201316" r="-300375" b="-907895"/>
                           </a:stretch>
                         </a:blipFill>
                       </a:tcPr>
@@ -11448,7 +12360,41 @@
                         <a:blipFill>
                           <a:blip r:embed="rId2"/>
                           <a:stretch>
-                            <a:fillRect l="-200375" t="-201316" r="-749" b="-907895"/>
+                            <a:fillRect l="-201128" t="-201316" r="-201504" b="-907895"/>
+                          </a:stretch>
+                        </a:blipFill>
+                      </a:tcPr>
+                    </a:tc>
+                    <a:tc>
+                      <a:txBody>
+                        <a:bodyPr/>
+                        <a:lstStyle/>
+                        <a:p>
+                          <a:endParaRPr lang="nl-NL"/>
+                        </a:p>
+                      </a:txBody>
+                      <a:tcPr>
+                        <a:blipFill>
+                          <a:blip r:embed="rId2"/>
+                          <a:stretch>
+                            <a:fillRect l="-300000" t="-201316" r="-100749" b="-907895"/>
+                          </a:stretch>
+                        </a:blipFill>
+                      </a:tcPr>
+                    </a:tc>
+                    <a:tc>
+                      <a:txBody>
+                        <a:bodyPr/>
+                        <a:lstStyle/>
+                        <a:p>
+                          <a:endParaRPr lang="nl-NL"/>
+                        </a:p>
+                      </a:txBody>
+                      <a:tcPr>
+                        <a:blipFill>
+                          <a:blip r:embed="rId2"/>
+                          <a:stretch>
+                            <a:fillRect l="-400000" t="-201316" r="-749" b="-907895"/>
                           </a:stretch>
                         </a:blipFill>
                       </a:tcPr>
@@ -11472,7 +12418,7 @@
                         <a:blipFill>
                           <a:blip r:embed="rId2"/>
                           <a:stretch>
-                            <a:fillRect l="-375" t="-297403" r="-200749" b="-796104"/>
+                            <a:fillRect l="-375" t="-297403" r="-400375" b="-796104"/>
                           </a:stretch>
                         </a:blipFill>
                       </a:tcPr>
@@ -11489,7 +12435,7 @@
                         <a:blipFill>
                           <a:blip r:embed="rId2"/>
                           <a:stretch>
-                            <a:fillRect l="-100375" t="-297403" r="-100749" b="-796104"/>
+                            <a:fillRect l="-100375" t="-297403" r="-300375" b="-796104"/>
                           </a:stretch>
                         </a:blipFill>
                       </a:tcPr>
@@ -11506,7 +12452,41 @@
                         <a:blipFill>
                           <a:blip r:embed="rId2"/>
                           <a:stretch>
-                            <a:fillRect l="-200375" t="-297403" r="-749" b="-796104"/>
+                            <a:fillRect l="-201128" t="-297403" r="-201504" b="-796104"/>
+                          </a:stretch>
+                        </a:blipFill>
+                      </a:tcPr>
+                    </a:tc>
+                    <a:tc>
+                      <a:txBody>
+                        <a:bodyPr/>
+                        <a:lstStyle/>
+                        <a:p>
+                          <a:endParaRPr lang="nl-NL"/>
+                        </a:p>
+                      </a:txBody>
+                      <a:tcPr>
+                        <a:blipFill>
+                          <a:blip r:embed="rId2"/>
+                          <a:stretch>
+                            <a:fillRect l="-300000" t="-297403" r="-100749" b="-796104"/>
+                          </a:stretch>
+                        </a:blipFill>
+                      </a:tcPr>
+                    </a:tc>
+                    <a:tc>
+                      <a:txBody>
+                        <a:bodyPr/>
+                        <a:lstStyle/>
+                        <a:p>
+                          <a:endParaRPr lang="nl-NL"/>
+                        </a:p>
+                      </a:txBody>
+                      <a:tcPr>
+                        <a:blipFill>
+                          <a:blip r:embed="rId2"/>
+                          <a:stretch>
+                            <a:fillRect l="-400000" t="-297403" r="-749" b="-796104"/>
                           </a:stretch>
                         </a:blipFill>
                       </a:tcPr>
@@ -11530,7 +12510,7 @@
                         <a:blipFill>
                           <a:blip r:embed="rId2"/>
                           <a:stretch>
-                            <a:fillRect l="-375" t="-402632" r="-200749" b="-706579"/>
+                            <a:fillRect l="-375" t="-402632" r="-400375" b="-706579"/>
                           </a:stretch>
                         </a:blipFill>
                       </a:tcPr>
@@ -11547,7 +12527,7 @@
                         <a:blipFill>
                           <a:blip r:embed="rId2"/>
                           <a:stretch>
-                            <a:fillRect l="-100375" t="-402632" r="-100749" b="-706579"/>
+                            <a:fillRect l="-100375" t="-402632" r="-300375" b="-706579"/>
                           </a:stretch>
                         </a:blipFill>
                       </a:tcPr>
@@ -11564,7 +12544,41 @@
                         <a:blipFill>
                           <a:blip r:embed="rId2"/>
                           <a:stretch>
-                            <a:fillRect l="-200375" t="-402632" r="-749" b="-706579"/>
+                            <a:fillRect l="-201128" t="-402632" r="-201504" b="-706579"/>
+                          </a:stretch>
+                        </a:blipFill>
+                      </a:tcPr>
+                    </a:tc>
+                    <a:tc>
+                      <a:txBody>
+                        <a:bodyPr/>
+                        <a:lstStyle/>
+                        <a:p>
+                          <a:endParaRPr lang="nl-NL"/>
+                        </a:p>
+                      </a:txBody>
+                      <a:tcPr>
+                        <a:blipFill>
+                          <a:blip r:embed="rId2"/>
+                          <a:stretch>
+                            <a:fillRect l="-300000" t="-402632" r="-100749" b="-706579"/>
+                          </a:stretch>
+                        </a:blipFill>
+                      </a:tcPr>
+                    </a:tc>
+                    <a:tc>
+                      <a:txBody>
+                        <a:bodyPr/>
+                        <a:lstStyle/>
+                        <a:p>
+                          <a:endParaRPr lang="nl-NL"/>
+                        </a:p>
+                      </a:txBody>
+                      <a:tcPr>
+                        <a:blipFill>
+                          <a:blip r:embed="rId2"/>
+                          <a:stretch>
+                            <a:fillRect l="-400000" t="-402632" r="-749" b="-706579"/>
                           </a:stretch>
                         </a:blipFill>
                       </a:tcPr>
@@ -11588,7 +12602,7 @@
                         <a:blipFill>
                           <a:blip r:embed="rId2"/>
                           <a:stretch>
-                            <a:fillRect l="-375" t="-496104" r="-200749" b="-597403"/>
+                            <a:fillRect l="-375" t="-496104" r="-400375" b="-597403"/>
                           </a:stretch>
                         </a:blipFill>
                       </a:tcPr>
@@ -11605,7 +12619,7 @@
                         <a:blipFill>
                           <a:blip r:embed="rId2"/>
                           <a:stretch>
-                            <a:fillRect l="-100375" t="-496104" r="-100749" b="-597403"/>
+                            <a:fillRect l="-100375" t="-496104" r="-300375" b="-597403"/>
                           </a:stretch>
                         </a:blipFill>
                       </a:tcPr>
@@ -11622,7 +12636,41 @@
                         <a:blipFill>
                           <a:blip r:embed="rId2"/>
                           <a:stretch>
-                            <a:fillRect l="-200375" t="-496104" r="-749" b="-597403"/>
+                            <a:fillRect l="-201128" t="-496104" r="-201504" b="-597403"/>
+                          </a:stretch>
+                        </a:blipFill>
+                      </a:tcPr>
+                    </a:tc>
+                    <a:tc>
+                      <a:txBody>
+                        <a:bodyPr/>
+                        <a:lstStyle/>
+                        <a:p>
+                          <a:endParaRPr lang="nl-NL"/>
+                        </a:p>
+                      </a:txBody>
+                      <a:tcPr>
+                        <a:blipFill>
+                          <a:blip r:embed="rId2"/>
+                          <a:stretch>
+                            <a:fillRect l="-300000" t="-496104" r="-100749" b="-597403"/>
+                          </a:stretch>
+                        </a:blipFill>
+                      </a:tcPr>
+                    </a:tc>
+                    <a:tc>
+                      <a:txBody>
+                        <a:bodyPr/>
+                        <a:lstStyle/>
+                        <a:p>
+                          <a:endParaRPr lang="nl-NL"/>
+                        </a:p>
+                      </a:txBody>
+                      <a:tcPr>
+                        <a:blipFill>
+                          <a:blip r:embed="rId2"/>
+                          <a:stretch>
+                            <a:fillRect l="-400000" t="-496104" r="-749" b="-597403"/>
                           </a:stretch>
                         </a:blipFill>
                       </a:tcPr>
@@ -11646,7 +12694,7 @@
                         <a:blipFill>
                           <a:blip r:embed="rId2"/>
                           <a:stretch>
-                            <a:fillRect l="-375" t="-603947" r="-200749" b="-505263"/>
+                            <a:fillRect l="-375" t="-603947" r="-400375" b="-505263"/>
                           </a:stretch>
                         </a:blipFill>
                       </a:tcPr>
@@ -11663,7 +12711,7 @@
                         <a:blipFill>
                           <a:blip r:embed="rId2"/>
                           <a:stretch>
-                            <a:fillRect l="-100375" t="-603947" r="-100749" b="-505263"/>
+                            <a:fillRect l="-100375" t="-603947" r="-300375" b="-505263"/>
                           </a:stretch>
                         </a:blipFill>
                       </a:tcPr>
@@ -11680,7 +12728,41 @@
                         <a:blipFill>
                           <a:blip r:embed="rId2"/>
                           <a:stretch>
-                            <a:fillRect l="-200375" t="-603947" r="-749" b="-505263"/>
+                            <a:fillRect l="-201128" t="-603947" r="-201504" b="-505263"/>
+                          </a:stretch>
+                        </a:blipFill>
+                      </a:tcPr>
+                    </a:tc>
+                    <a:tc>
+                      <a:txBody>
+                        <a:bodyPr/>
+                        <a:lstStyle/>
+                        <a:p>
+                          <a:endParaRPr lang="nl-NL"/>
+                        </a:p>
+                      </a:txBody>
+                      <a:tcPr>
+                        <a:blipFill>
+                          <a:blip r:embed="rId2"/>
+                          <a:stretch>
+                            <a:fillRect l="-300000" t="-603947" r="-100749" b="-505263"/>
+                          </a:stretch>
+                        </a:blipFill>
+                      </a:tcPr>
+                    </a:tc>
+                    <a:tc>
+                      <a:txBody>
+                        <a:bodyPr/>
+                        <a:lstStyle/>
+                        <a:p>
+                          <a:endParaRPr lang="nl-NL"/>
+                        </a:p>
+                      </a:txBody>
+                      <a:tcPr>
+                        <a:blipFill>
+                          <a:blip r:embed="rId2"/>
+                          <a:stretch>
+                            <a:fillRect l="-400000" t="-603947" r="-749" b="-505263"/>
                           </a:stretch>
                         </a:blipFill>
                       </a:tcPr>
@@ -11704,7 +12786,7 @@
                         <a:blipFill>
                           <a:blip r:embed="rId2"/>
                           <a:stretch>
-                            <a:fillRect l="-375" t="-703947" r="-200749" b="-405263"/>
+                            <a:fillRect l="-375" t="-703947" r="-400375" b="-405263"/>
                           </a:stretch>
                         </a:blipFill>
                       </a:tcPr>
@@ -11721,7 +12803,7 @@
                         <a:blipFill>
                           <a:blip r:embed="rId2"/>
                           <a:stretch>
-                            <a:fillRect l="-100375" t="-703947" r="-100749" b="-405263"/>
+                            <a:fillRect l="-100375" t="-703947" r="-300375" b="-405263"/>
                           </a:stretch>
                         </a:blipFill>
                       </a:tcPr>
@@ -11738,7 +12820,41 @@
                         <a:blipFill>
                           <a:blip r:embed="rId2"/>
                           <a:stretch>
-                            <a:fillRect l="-200375" t="-703947" r="-749" b="-405263"/>
+                            <a:fillRect l="-201128" t="-703947" r="-201504" b="-405263"/>
+                          </a:stretch>
+                        </a:blipFill>
+                      </a:tcPr>
+                    </a:tc>
+                    <a:tc>
+                      <a:txBody>
+                        <a:bodyPr/>
+                        <a:lstStyle/>
+                        <a:p>
+                          <a:endParaRPr lang="nl-NL"/>
+                        </a:p>
+                      </a:txBody>
+                      <a:tcPr>
+                        <a:blipFill>
+                          <a:blip r:embed="rId2"/>
+                          <a:stretch>
+                            <a:fillRect l="-300000" t="-703947" r="-100749" b="-405263"/>
+                          </a:stretch>
+                        </a:blipFill>
+                      </a:tcPr>
+                    </a:tc>
+                    <a:tc>
+                      <a:txBody>
+                        <a:bodyPr/>
+                        <a:lstStyle/>
+                        <a:p>
+                          <a:endParaRPr lang="nl-NL"/>
+                        </a:p>
+                      </a:txBody>
+                      <a:tcPr>
+                        <a:blipFill>
+                          <a:blip r:embed="rId2"/>
+                          <a:stretch>
+                            <a:fillRect l="-400000" t="-703947" r="-749" b="-405263"/>
                           </a:stretch>
                         </a:blipFill>
                       </a:tcPr>
@@ -11762,7 +12878,7 @@
                         <a:blipFill>
                           <a:blip r:embed="rId2"/>
                           <a:stretch>
-                            <a:fillRect l="-375" t="-793506" r="-200749" b="-300000"/>
+                            <a:fillRect l="-375" t="-793506" r="-400375" b="-300000"/>
                           </a:stretch>
                         </a:blipFill>
                       </a:tcPr>
@@ -11779,7 +12895,7 @@
                         <a:blipFill>
                           <a:blip r:embed="rId2"/>
                           <a:stretch>
-                            <a:fillRect l="-100375" t="-793506" r="-100749" b="-300000"/>
+                            <a:fillRect l="-100375" t="-793506" r="-300375" b="-300000"/>
                           </a:stretch>
                         </a:blipFill>
                       </a:tcPr>
@@ -11796,7 +12912,41 @@
                         <a:blipFill>
                           <a:blip r:embed="rId2"/>
                           <a:stretch>
-                            <a:fillRect l="-200375" t="-793506" r="-749" b="-300000"/>
+                            <a:fillRect l="-201128" t="-793506" r="-201504" b="-300000"/>
+                          </a:stretch>
+                        </a:blipFill>
+                      </a:tcPr>
+                    </a:tc>
+                    <a:tc>
+                      <a:txBody>
+                        <a:bodyPr/>
+                        <a:lstStyle/>
+                        <a:p>
+                          <a:endParaRPr lang="nl-NL"/>
+                        </a:p>
+                      </a:txBody>
+                      <a:tcPr>
+                        <a:blipFill>
+                          <a:blip r:embed="rId2"/>
+                          <a:stretch>
+                            <a:fillRect l="-300000" t="-793506" r="-100749" b="-300000"/>
+                          </a:stretch>
+                        </a:blipFill>
+                      </a:tcPr>
+                    </a:tc>
+                    <a:tc>
+                      <a:txBody>
+                        <a:bodyPr/>
+                        <a:lstStyle/>
+                        <a:p>
+                          <a:endParaRPr lang="nl-NL"/>
+                        </a:p>
+                      </a:txBody>
+                      <a:tcPr>
+                        <a:blipFill>
+                          <a:blip r:embed="rId2"/>
+                          <a:stretch>
+                            <a:fillRect l="-400000" t="-793506" r="-749" b="-300000"/>
                           </a:stretch>
                         </a:blipFill>
                       </a:tcPr>
@@ -11820,7 +12970,7 @@
                         <a:blipFill>
                           <a:blip r:embed="rId2"/>
                           <a:stretch>
-                            <a:fillRect l="-375" t="-905263" r="-200749" b="-203947"/>
+                            <a:fillRect l="-375" t="-905263" r="-400375" b="-203947"/>
                           </a:stretch>
                         </a:blipFill>
                       </a:tcPr>
@@ -11837,7 +12987,7 @@
                         <a:blipFill>
                           <a:blip r:embed="rId2"/>
                           <a:stretch>
-                            <a:fillRect l="-100375" t="-905263" r="-100749" b="-203947"/>
+                            <a:fillRect l="-100375" t="-905263" r="-300375" b="-203947"/>
                           </a:stretch>
                         </a:blipFill>
                       </a:tcPr>
@@ -11854,7 +13004,41 @@
                         <a:blipFill>
                           <a:blip r:embed="rId2"/>
                           <a:stretch>
-                            <a:fillRect l="-200375" t="-905263" r="-749" b="-203947"/>
+                            <a:fillRect l="-201128" t="-905263" r="-201504" b="-203947"/>
+                          </a:stretch>
+                        </a:blipFill>
+                      </a:tcPr>
+                    </a:tc>
+                    <a:tc>
+                      <a:txBody>
+                        <a:bodyPr/>
+                        <a:lstStyle/>
+                        <a:p>
+                          <a:endParaRPr lang="nl-NL"/>
+                        </a:p>
+                      </a:txBody>
+                      <a:tcPr>
+                        <a:blipFill>
+                          <a:blip r:embed="rId2"/>
+                          <a:stretch>
+                            <a:fillRect l="-300000" t="-905263" r="-100749" b="-203947"/>
+                          </a:stretch>
+                        </a:blipFill>
+                      </a:tcPr>
+                    </a:tc>
+                    <a:tc>
+                      <a:txBody>
+                        <a:bodyPr/>
+                        <a:lstStyle/>
+                        <a:p>
+                          <a:endParaRPr lang="nl-NL"/>
+                        </a:p>
+                      </a:txBody>
+                      <a:tcPr>
+                        <a:blipFill>
+                          <a:blip r:embed="rId2"/>
+                          <a:stretch>
+                            <a:fillRect l="-400000" t="-905263" r="-749" b="-203947"/>
                           </a:stretch>
                         </a:blipFill>
                       </a:tcPr>
@@ -11878,7 +13062,7 @@
                         <a:blipFill>
                           <a:blip r:embed="rId2"/>
                           <a:stretch>
-                            <a:fillRect l="-375" t="-992208" r="-200749" b="-101299"/>
+                            <a:fillRect l="-375" t="-992208" r="-400375" b="-101299"/>
                           </a:stretch>
                         </a:blipFill>
                       </a:tcPr>
@@ -11895,7 +13079,7 @@
                         <a:blipFill>
                           <a:blip r:embed="rId2"/>
                           <a:stretch>
-                            <a:fillRect l="-100375" t="-992208" r="-100749" b="-101299"/>
+                            <a:fillRect l="-100375" t="-992208" r="-300375" b="-101299"/>
                           </a:stretch>
                         </a:blipFill>
                       </a:tcPr>
@@ -11912,7 +13096,41 @@
                         <a:blipFill>
                           <a:blip r:embed="rId2"/>
                           <a:stretch>
-                            <a:fillRect l="-200375" t="-992208" r="-749" b="-101299"/>
+                            <a:fillRect l="-201128" t="-992208" r="-201504" b="-101299"/>
+                          </a:stretch>
+                        </a:blipFill>
+                      </a:tcPr>
+                    </a:tc>
+                    <a:tc>
+                      <a:txBody>
+                        <a:bodyPr/>
+                        <a:lstStyle/>
+                        <a:p>
+                          <a:endParaRPr lang="nl-NL"/>
+                        </a:p>
+                      </a:txBody>
+                      <a:tcPr>
+                        <a:blipFill>
+                          <a:blip r:embed="rId2"/>
+                          <a:stretch>
+                            <a:fillRect l="-300000" t="-992208" r="-100749" b="-101299"/>
+                          </a:stretch>
+                        </a:blipFill>
+                      </a:tcPr>
+                    </a:tc>
+                    <a:tc>
+                      <a:txBody>
+                        <a:bodyPr/>
+                        <a:lstStyle/>
+                        <a:p>
+                          <a:endParaRPr lang="nl-NL"/>
+                        </a:p>
+                      </a:txBody>
+                      <a:tcPr>
+                        <a:blipFill>
+                          <a:blip r:embed="rId2"/>
+                          <a:stretch>
+                            <a:fillRect l="-400000" t="-992208" r="-749" b="-101299"/>
                           </a:stretch>
                         </a:blipFill>
                       </a:tcPr>
@@ -11936,7 +13154,7 @@
                         <a:blipFill>
                           <a:blip r:embed="rId2"/>
                           <a:stretch>
-                            <a:fillRect l="-375" t="-1106579" r="-200749" b="-2632"/>
+                            <a:fillRect l="-375" t="-1106579" r="-400375" b="-2632"/>
                           </a:stretch>
                         </a:blipFill>
                       </a:tcPr>
@@ -11953,7 +13171,7 @@
                         <a:blipFill>
                           <a:blip r:embed="rId2"/>
                           <a:stretch>
-                            <a:fillRect l="-100375" t="-1106579" r="-100749" b="-2632"/>
+                            <a:fillRect l="-100375" t="-1106579" r="-300375" b="-2632"/>
                           </a:stretch>
                         </a:blipFill>
                       </a:tcPr>
@@ -11970,7 +13188,41 @@
                         <a:blipFill>
                           <a:blip r:embed="rId2"/>
                           <a:stretch>
-                            <a:fillRect l="-200375" t="-1106579" r="-749" b="-2632"/>
+                            <a:fillRect l="-201128" t="-1106579" r="-201504" b="-2632"/>
+                          </a:stretch>
+                        </a:blipFill>
+                      </a:tcPr>
+                    </a:tc>
+                    <a:tc>
+                      <a:txBody>
+                        <a:bodyPr/>
+                        <a:lstStyle/>
+                        <a:p>
+                          <a:endParaRPr lang="nl-NL"/>
+                        </a:p>
+                      </a:txBody>
+                      <a:tcPr>
+                        <a:blipFill>
+                          <a:blip r:embed="rId2"/>
+                          <a:stretch>
+                            <a:fillRect l="-300000" t="-1106579" r="-100749" b="-2632"/>
+                          </a:stretch>
+                        </a:blipFill>
+                      </a:tcPr>
+                    </a:tc>
+                    <a:tc>
+                      <a:txBody>
+                        <a:bodyPr/>
+                        <a:lstStyle/>
+                        <a:p>
+                          <a:endParaRPr lang="nl-NL"/>
+                        </a:p>
+                      </a:txBody>
+                      <a:tcPr>
+                        <a:blipFill>
+                          <a:blip r:embed="rId2"/>
+                          <a:stretch>
+                            <a:fillRect l="-400000" t="-1106579" r="-749" b="-2632"/>
                           </a:stretch>
                         </a:blipFill>
                       </a:tcPr>
@@ -11987,10 +13239,62 @@
           </p:graphicFrame>
         </mc:Fallback>
       </mc:AlternateContent>
+      <p:sp>
+        <p:nvSpPr>
+          <p:cNvPr id="4" name="Rectangle 3">
+            <a:extLst>
+              <a:ext uri="{FF2B5EF4-FFF2-40B4-BE49-F238E27FC236}">
+                <a16:creationId xmlns:a16="http://schemas.microsoft.com/office/drawing/2014/main" id="{AD7878F7-648B-079E-88B1-0E53CDEBA92C}"/>
+              </a:ext>
+            </a:extLst>
+          </p:cNvPr>
+          <p:cNvSpPr/>
+          <p:nvPr/>
+        </p:nvSpPr>
+        <p:spPr>
+          <a:xfrm>
+            <a:off x="5006566" y="1385180"/>
+            <a:ext cx="4865221" cy="5191666"/>
+          </a:xfrm>
+          <a:prstGeom prst="rect">
+            <a:avLst/>
+          </a:prstGeom>
+          <a:solidFill>
+            <a:schemeClr val="bg1"/>
+          </a:solidFill>
+          <a:ln>
+            <a:noFill/>
+          </a:ln>
+        </p:spPr>
+        <p:style>
+          <a:lnRef idx="2">
+            <a:schemeClr val="accent1">
+              <a:shade val="50000"/>
+            </a:schemeClr>
+          </a:lnRef>
+          <a:fillRef idx="1">
+            <a:schemeClr val="accent1"/>
+          </a:fillRef>
+          <a:effectRef idx="0">
+            <a:schemeClr val="accent1"/>
+          </a:effectRef>
+          <a:fontRef idx="minor">
+            <a:schemeClr val="lt1"/>
+          </a:fontRef>
+        </p:style>
+        <p:txBody>
+          <a:bodyPr rtlCol="0" anchor="ctr"/>
+          <a:lstStyle/>
+          <a:p>
+            <a:pPr algn="ctr"/>
+            <a:endParaRPr lang="nl-NL"/>
+          </a:p>
+        </p:txBody>
+      </p:sp>
     </p:spTree>
     <p:extLst>
       <p:ext uri="{BB962C8B-B14F-4D97-AF65-F5344CB8AC3E}">
-        <p14:creationId xmlns:p14="http://schemas.microsoft.com/office/powerpoint/2010/main" val="3475296742"/>
+        <p14:creationId xmlns:p14="http://schemas.microsoft.com/office/powerpoint/2010/main" val="3747369194"/>
       </p:ext>
     </p:extLst>
   </p:cSld>
@@ -32051,7 +33355,7 @@
         </p:spPr>
         <p:txBody>
           <a:bodyPr>
-            <a:normAutofit/>
+            <a:normAutofit fontScale="92500" lnSpcReduction="10000"/>
           </a:bodyPr>
           <a:lstStyle/>
           <a:p>
@@ -32122,16 +33426,33 @@
                 </a:solidFill>
                 <a:latin typeface="Fira Sans" pitchFamily="34"/>
               </a:rPr>
-              <a:t>From July: Assistant Professor @ Data Science and Biostatistics, Julius </a:t>
+              <a:t>From July: Assistant Professor @ Data Science and Biostatistics, Julius Center, UMC Utrecht</a:t>
             </a:r>
+          </a:p>
+          <a:p>
+            <a:pPr>
+              <a:lnSpc>
+                <a:spcPct val="110000"/>
+              </a:lnSpc>
+            </a:pPr>
             <a:r>
-              <a:rPr lang="en-GB" sz="1700" dirty="0" err="1">
+              <a:rPr lang="en-GB" sz="1700" dirty="0">
                 <a:solidFill>
                   <a:srgbClr val="404040"/>
                 </a:solidFill>
                 <a:latin typeface="Fira Sans" pitchFamily="34"/>
               </a:rPr>
-              <a:t>Center</a:t>
+              <a:t>Co-ordinator </a:t>
+            </a:r>
+            <a:r>
+              <a:rPr lang="en-GB" sz="1700" dirty="0">
+                <a:solidFill>
+                  <a:srgbClr val="404040"/>
+                </a:solidFill>
+                <a:latin typeface="Fira Sans" pitchFamily="34"/>
+                <a:hlinkClick r:id="rId2"/>
+              </a:rPr>
+              <a:t>Special Interest Group in Causal Data Science </a:t>
             </a:r>
             <a:r>
               <a:rPr lang="en-GB" sz="1700" dirty="0">
@@ -32140,7 +33461,7 @@
                 </a:solidFill>
                 <a:latin typeface="Fira Sans" pitchFamily="34"/>
               </a:rPr>
-              <a:t>, UMC Utrecht</a:t>
+              <a:t>UU/UMCU</a:t>
             </a:r>
           </a:p>
           <a:p>
@@ -32165,7 +33486,7 @@
                   <a:srgbClr val="404040"/>
                 </a:solidFill>
                 <a:latin typeface="Fira Sans" pitchFamily="34"/>
-                <a:hlinkClick r:id="rId2"/>
+                <a:hlinkClick r:id="rId3"/>
               </a:rPr>
               <a:t>oisinryan.org </a:t>
             </a:r>
@@ -32235,7 +33556,7 @@
                 </a:solidFill>
                 <a:latin typeface="Fira Sans" pitchFamily="34"/>
               </a:rPr>
-              <a:t>Causal inference, causal discovery, time-series analysis, computational modeling, visualisation, Bayesian statistics, multilevel models, open science &amp; reproducibility</a:t>
+              <a:t>Causal inference, causal discovery, time-series analysis, computational modeling and complex systems, Bayesian statistics, multilevel models, open science &amp; reproducibility, R programming</a:t>
             </a:r>
           </a:p>
         </p:txBody>
@@ -32255,7 +33576,7 @@
           <p:nvPr/>
         </p:nvPicPr>
         <p:blipFill>
-          <a:blip r:embed="rId3">
+          <a:blip r:embed="rId4">
             <a:extLst>
               <a:ext uri="{28A0092B-C50C-407E-A947-70E740481C1C}">
                 <a14:useLocalDpi xmlns:a14="http://schemas.microsoft.com/office/drawing/2010/main" val="0"/>
@@ -41596,7 +42917,7 @@
         </p:spPr>
         <p:txBody>
           <a:bodyPr anchorCtr="1">
-            <a:normAutofit fontScale="90000"/>
+            <a:noAutofit/>
           </a:bodyPr>
           <a:lstStyle/>
           <a:p>
@@ -41606,7 +42927,7 @@
               </a:lnSpc>
             </a:pPr>
             <a:r>
-              <a:rPr lang="en-GB" sz="5400" b="1" kern="0" dirty="0">
+              <a:rPr lang="en-GB" sz="2400" b="1" kern="0" dirty="0">
                 <a:solidFill>
                   <a:srgbClr val="FFFFFF"/>
                 </a:solidFill>
@@ -41616,7 +42937,7 @@
               <a:t>github.com/</a:t>
             </a:r>
             <a:r>
-              <a:rPr lang="en-GB" sz="5400" b="1" kern="0" dirty="0" err="1">
+              <a:rPr lang="en-GB" sz="2400" b="1" kern="0" dirty="0" err="1">
                 <a:solidFill>
                   <a:srgbClr val="FFFFFF"/>
                 </a:solidFill>
@@ -41626,7 +42947,7 @@
               <a:t>sodascience</a:t>
             </a:r>
             <a:r>
-              <a:rPr lang="en-GB" sz="5400" b="1" kern="0" dirty="0">
+              <a:rPr lang="en-GB" sz="2400" b="1" kern="0" dirty="0">
                 <a:solidFill>
                   <a:srgbClr val="FFFFFF"/>
                 </a:solidFill>
@@ -41636,7 +42957,7 @@
               <a:t>/</a:t>
             </a:r>
             <a:r>
-              <a:rPr lang="en-GB" sz="5400" b="1" kern="0" dirty="0" err="1">
+              <a:rPr lang="en-GB" sz="2400" b="1" kern="0" dirty="0" err="1">
                 <a:solidFill>
                   <a:srgbClr val="FFFFFF"/>
                 </a:solidFill>
@@ -41645,7 +42966,7 @@
               </a:rPr>
               <a:t>workshop_causal_impact_assessment</a:t>
             </a:r>
-            <a:endParaRPr lang="en-GB" sz="1800" kern="0" dirty="0">
+            <a:endParaRPr lang="en-GB" sz="800" kern="0" dirty="0">
               <a:solidFill>
                 <a:srgbClr val="FFFFFF"/>
               </a:solidFill>
@@ -42526,7 +43847,7 @@
                 </a:solidFill>
                 <a:latin typeface="Fira Sans" pitchFamily="34"/>
               </a:rPr>
-              <a:t>Synthetic CITS an </a:t>
+              <a:t>Controlled ITS an </a:t>
             </a:r>
             <a:r>
               <a:rPr lang="en-GB" sz="3600" dirty="0" err="1">
@@ -43099,7 +44420,7 @@
                 </a:solidFill>
                 <a:latin typeface="Fira Sans" pitchFamily="34"/>
               </a:rPr>
-              <a:t>Did the intervention produces changes in the outcome for that unit?</a:t>
+              <a:t>Did the intervention produce a change in the outcome for that unit?</a:t>
             </a:r>
           </a:p>
           <a:p>

</xml_diff>